<commit_message>
edit images and readme
</commit_message>
<xml_diff>
--- a/images/ProcessMap.pptx
+++ b/images/ProcessMap.pptx
@@ -6,18 +6,10 @@
   </p:sldMasterIdLst>
   <p:sldIdLst>
     <p:sldId id="266" r:id="rId2"/>
-    <p:sldId id="261" r:id="rId3"/>
-    <p:sldId id="265" r:id="rId4"/>
-    <p:sldId id="260" r:id="rId5"/>
-    <p:sldId id="262" r:id="rId6"/>
-    <p:sldId id="263" r:id="rId7"/>
-    <p:sldId id="268" r:id="rId8"/>
-    <p:sldId id="269" r:id="rId9"/>
-    <p:sldId id="270" r:id="rId10"/>
-    <p:sldId id="264" r:id="rId11"/>
-    <p:sldId id="271" r:id="rId12"/>
-    <p:sldId id="257" r:id="rId13"/>
-    <p:sldId id="267" r:id="rId14"/>
+    <p:sldId id="267" r:id="rId3"/>
+    <p:sldId id="268" r:id="rId4"/>
+    <p:sldId id="269" r:id="rId5"/>
+    <p:sldId id="270" r:id="rId6"/>
   </p:sldIdLst>
   <p:sldSz cx="12192000" cy="6858000"/>
   <p:notesSz cx="6858000" cy="9144000"/>
@@ -127,7 +119,7 @@
 <file path=ppt/revisionInfo.xml><?xml version="1.0" encoding="utf-8"?>
 <p1510:revInfo xmlns:a="http://schemas.openxmlformats.org/drawingml/2006/main" xmlns:r="http://schemas.openxmlformats.org/officeDocument/2006/relationships" xmlns:p1510="http://schemas.microsoft.com/office/powerpoint/2015/10/main">
   <p1510:revLst>
-    <p1510:client id="{D38C5BE2-17A7-461C-BD94-6C0C7CDA27B5}" v="79" dt="2022-05-19T22:51:11.256"/>
+    <p1510:client id="{D38C5BE2-17A7-461C-BD94-6C0C7CDA27B5}" v="103" dt="2022-05-20T00:22:58.082"/>
   </p1510:revLst>
 </p1510:revInfo>
 </file>
@@ -136,27 +128,92 @@
 <pc:chgInfo xmlns:a="http://schemas.openxmlformats.org/drawingml/2006/main" xmlns:r="http://schemas.openxmlformats.org/officeDocument/2006/relationships" xmlns:ac="http://schemas.microsoft.com/office/drawing/2013/main/command" xmlns:pc="http://schemas.microsoft.com/office/powerpoint/2013/main/command">
   <pc:docChgLst>
     <pc:chgData name="Jared Fiacco" userId="e4f6bfaef04c63d1" providerId="LiveId" clId="{D38C5BE2-17A7-461C-BD94-6C0C7CDA27B5}"/>
-    <pc:docChg chg="modSld">
-      <pc:chgData name="Jared Fiacco" userId="e4f6bfaef04c63d1" providerId="LiveId" clId="{D38C5BE2-17A7-461C-BD94-6C0C7CDA27B5}" dt="2022-05-19T22:51:11.256" v="2" actId="1076"/>
+    <pc:docChg chg="undo custSel addSld delSld modSld">
+      <pc:chgData name="Jared Fiacco" userId="e4f6bfaef04c63d1" providerId="LiveId" clId="{D38C5BE2-17A7-461C-BD94-6C0C7CDA27B5}" dt="2022-05-20T00:23:04.046" v="344" actId="478"/>
       <pc:docMkLst>
         <pc:docMk/>
       </pc:docMkLst>
-      <pc:sldChg chg="delSp modSp">
-        <pc:chgData name="Jared Fiacco" userId="e4f6bfaef04c63d1" providerId="LiveId" clId="{D38C5BE2-17A7-461C-BD94-6C0C7CDA27B5}" dt="2022-05-19T22:51:11.256" v="2" actId="1076"/>
+      <pc:sldChg chg="del">
+        <pc:chgData name="Jared Fiacco" userId="e4f6bfaef04c63d1" providerId="LiveId" clId="{D38C5BE2-17A7-461C-BD94-6C0C7CDA27B5}" dt="2022-05-19T23:49:25.274" v="303" actId="47"/>
+        <pc:sldMkLst>
+          <pc:docMk/>
+          <pc:sldMk cId="3995841754" sldId="257"/>
+        </pc:sldMkLst>
+      </pc:sldChg>
+      <pc:sldChg chg="del">
+        <pc:chgData name="Jared Fiacco" userId="e4f6bfaef04c63d1" providerId="LiveId" clId="{D38C5BE2-17A7-461C-BD94-6C0C7CDA27B5}" dt="2022-05-19T23:49:20.799" v="295" actId="47"/>
+        <pc:sldMkLst>
+          <pc:docMk/>
+          <pc:sldMk cId="2533316695" sldId="260"/>
+        </pc:sldMkLst>
+      </pc:sldChg>
+      <pc:sldChg chg="del">
+        <pc:chgData name="Jared Fiacco" userId="e4f6bfaef04c63d1" providerId="LiveId" clId="{D38C5BE2-17A7-461C-BD94-6C0C7CDA27B5}" dt="2022-05-19T23:49:19.176" v="293" actId="47"/>
+        <pc:sldMkLst>
+          <pc:docMk/>
+          <pc:sldMk cId="3500024006" sldId="261"/>
+        </pc:sldMkLst>
+      </pc:sldChg>
+      <pc:sldChg chg="del">
+        <pc:chgData name="Jared Fiacco" userId="e4f6bfaef04c63d1" providerId="LiveId" clId="{D38C5BE2-17A7-461C-BD94-6C0C7CDA27B5}" dt="2022-05-19T23:49:21.480" v="296" actId="47"/>
+        <pc:sldMkLst>
+          <pc:docMk/>
+          <pc:sldMk cId="4212965284" sldId="262"/>
+        </pc:sldMkLst>
+      </pc:sldChg>
+      <pc:sldChg chg="del">
+        <pc:chgData name="Jared Fiacco" userId="e4f6bfaef04c63d1" providerId="LiveId" clId="{D38C5BE2-17A7-461C-BD94-6C0C7CDA27B5}" dt="2022-05-19T23:49:22.130" v="297" actId="47"/>
+        <pc:sldMkLst>
+          <pc:docMk/>
+          <pc:sldMk cId="822399426" sldId="263"/>
+        </pc:sldMkLst>
+      </pc:sldChg>
+      <pc:sldChg chg="del">
+        <pc:chgData name="Jared Fiacco" userId="e4f6bfaef04c63d1" providerId="LiveId" clId="{D38C5BE2-17A7-461C-BD94-6C0C7CDA27B5}" dt="2022-05-19T23:49:23.912" v="301" actId="47"/>
+        <pc:sldMkLst>
+          <pc:docMk/>
+          <pc:sldMk cId="3824346644" sldId="264"/>
+        </pc:sldMkLst>
+      </pc:sldChg>
+      <pc:sldChg chg="del">
+        <pc:chgData name="Jared Fiacco" userId="e4f6bfaef04c63d1" providerId="LiveId" clId="{D38C5BE2-17A7-461C-BD94-6C0C7CDA27B5}" dt="2022-05-19T23:49:20.064" v="294" actId="47"/>
+        <pc:sldMkLst>
+          <pc:docMk/>
+          <pc:sldMk cId="3204689719" sldId="265"/>
+        </pc:sldMkLst>
+      </pc:sldChg>
+      <pc:sldChg chg="addSp delSp modSp mod">
+        <pc:chgData name="Jared Fiacco" userId="e4f6bfaef04c63d1" providerId="LiveId" clId="{D38C5BE2-17A7-461C-BD94-6C0C7CDA27B5}" dt="2022-05-19T23:48:58.648" v="292" actId="1076"/>
         <pc:sldMkLst>
           <pc:docMk/>
           <pc:sldMk cId="2637552424" sldId="266"/>
         </pc:sldMkLst>
+        <pc:spChg chg="add mod ord">
+          <ac:chgData name="Jared Fiacco" userId="e4f6bfaef04c63d1" providerId="LiveId" clId="{D38C5BE2-17A7-461C-BD94-6C0C7CDA27B5}" dt="2022-05-19T23:48:58.648" v="292" actId="1076"/>
+          <ac:spMkLst>
+            <pc:docMk/>
+            <pc:sldMk cId="2637552424" sldId="266"/>
+            <ac:spMk id="7" creationId="{DC8B8C25-E888-B12C-0492-5ED76DA79D84}"/>
+          </ac:spMkLst>
+        </pc:spChg>
         <pc:spChg chg="mod">
-          <ac:chgData name="Jared Fiacco" userId="e4f6bfaef04c63d1" providerId="LiveId" clId="{D38C5BE2-17A7-461C-BD94-6C0C7CDA27B5}" dt="2022-05-19T22:51:11.256" v="2" actId="1076"/>
+          <ac:chgData name="Jared Fiacco" userId="e4f6bfaef04c63d1" providerId="LiveId" clId="{D38C5BE2-17A7-461C-BD94-6C0C7CDA27B5}" dt="2022-05-19T23:48:58.648" v="292" actId="1076"/>
           <ac:spMkLst>
             <pc:docMk/>
             <pc:sldMk cId="2637552424" sldId="266"/>
             <ac:spMk id="38" creationId="{FB331FEB-7A12-1CEE-33B8-6F50F3A3886C}"/>
           </ac:spMkLst>
         </pc:spChg>
+        <pc:spChg chg="add mod">
+          <ac:chgData name="Jared Fiacco" userId="e4f6bfaef04c63d1" providerId="LiveId" clId="{D38C5BE2-17A7-461C-BD94-6C0C7CDA27B5}" dt="2022-05-19T23:48:58.648" v="292" actId="1076"/>
+          <ac:spMkLst>
+            <pc:docMk/>
+            <pc:sldMk cId="2637552424" sldId="266"/>
+            <ac:spMk id="39" creationId="{CC445EB6-0CEE-8D4A-EB26-4E70CD0D8890}"/>
+          </ac:spMkLst>
+        </pc:spChg>
         <pc:spChg chg="mod">
-          <ac:chgData name="Jared Fiacco" userId="e4f6bfaef04c63d1" providerId="LiveId" clId="{D38C5BE2-17A7-461C-BD94-6C0C7CDA27B5}" dt="2022-05-19T22:51:11.256" v="2" actId="1076"/>
+          <ac:chgData name="Jared Fiacco" userId="e4f6bfaef04c63d1" providerId="LiveId" clId="{D38C5BE2-17A7-461C-BD94-6C0C7CDA27B5}" dt="2022-05-19T23:48:58.648" v="292" actId="1076"/>
           <ac:spMkLst>
             <pc:docMk/>
             <pc:sldMk cId="2637552424" sldId="266"/>
@@ -164,7 +221,7 @@
           </ac:spMkLst>
         </pc:spChg>
         <pc:spChg chg="mod">
-          <ac:chgData name="Jared Fiacco" userId="e4f6bfaef04c63d1" providerId="LiveId" clId="{D38C5BE2-17A7-461C-BD94-6C0C7CDA27B5}" dt="2022-05-19T22:51:11.256" v="2" actId="1076"/>
+          <ac:chgData name="Jared Fiacco" userId="e4f6bfaef04c63d1" providerId="LiveId" clId="{D38C5BE2-17A7-461C-BD94-6C0C7CDA27B5}" dt="2022-05-19T23:48:58.648" v="292" actId="1076"/>
           <ac:spMkLst>
             <pc:docMk/>
             <pc:sldMk cId="2637552424" sldId="266"/>
@@ -172,15 +229,15 @@
           </ac:spMkLst>
         </pc:spChg>
         <pc:spChg chg="mod">
-          <ac:chgData name="Jared Fiacco" userId="e4f6bfaef04c63d1" providerId="LiveId" clId="{D38C5BE2-17A7-461C-BD94-6C0C7CDA27B5}" dt="2022-05-19T22:51:11.256" v="2" actId="1076"/>
+          <ac:chgData name="Jared Fiacco" userId="e4f6bfaef04c63d1" providerId="LiveId" clId="{D38C5BE2-17A7-461C-BD94-6C0C7CDA27B5}" dt="2022-05-19T23:48:58.648" v="292" actId="1076"/>
           <ac:spMkLst>
             <pc:docMk/>
             <pc:sldMk cId="2637552424" sldId="266"/>
             <ac:spMk id="44" creationId="{573F4EF7-DDBC-4CC4-A95C-DD8AEB8B3A09}"/>
           </ac:spMkLst>
         </pc:spChg>
-        <pc:spChg chg="mod">
-          <ac:chgData name="Jared Fiacco" userId="e4f6bfaef04c63d1" providerId="LiveId" clId="{D38C5BE2-17A7-461C-BD94-6C0C7CDA27B5}" dt="2022-05-19T22:51:11.256" v="2" actId="1076"/>
+        <pc:spChg chg="mod ord">
+          <ac:chgData name="Jared Fiacco" userId="e4f6bfaef04c63d1" providerId="LiveId" clId="{D38C5BE2-17A7-461C-BD94-6C0C7CDA27B5}" dt="2022-05-19T23:48:58.648" v="292" actId="1076"/>
           <ac:spMkLst>
             <pc:docMk/>
             <pc:sldMk cId="2637552424" sldId="266"/>
@@ -188,7 +245,7 @@
           </ac:spMkLst>
         </pc:spChg>
         <pc:spChg chg="mod">
-          <ac:chgData name="Jared Fiacco" userId="e4f6bfaef04c63d1" providerId="LiveId" clId="{D38C5BE2-17A7-461C-BD94-6C0C7CDA27B5}" dt="2022-05-19T22:51:11.256" v="2" actId="1076"/>
+          <ac:chgData name="Jared Fiacco" userId="e4f6bfaef04c63d1" providerId="LiveId" clId="{D38C5BE2-17A7-461C-BD94-6C0C7CDA27B5}" dt="2022-05-19T23:48:58.648" v="292" actId="1076"/>
           <ac:spMkLst>
             <pc:docMk/>
             <pc:sldMk cId="2637552424" sldId="266"/>
@@ -196,7 +253,7 @@
           </ac:spMkLst>
         </pc:spChg>
         <pc:spChg chg="mod">
-          <ac:chgData name="Jared Fiacco" userId="e4f6bfaef04c63d1" providerId="LiveId" clId="{D38C5BE2-17A7-461C-BD94-6C0C7CDA27B5}" dt="2022-05-19T22:51:11.256" v="2" actId="1076"/>
+          <ac:chgData name="Jared Fiacco" userId="e4f6bfaef04c63d1" providerId="LiveId" clId="{D38C5BE2-17A7-461C-BD94-6C0C7CDA27B5}" dt="2022-05-19T23:48:58.648" v="292" actId="1076"/>
           <ac:spMkLst>
             <pc:docMk/>
             <pc:sldMk cId="2637552424" sldId="266"/>
@@ -204,7 +261,7 @@
           </ac:spMkLst>
         </pc:spChg>
         <pc:spChg chg="mod">
-          <ac:chgData name="Jared Fiacco" userId="e4f6bfaef04c63d1" providerId="LiveId" clId="{D38C5BE2-17A7-461C-BD94-6C0C7CDA27B5}" dt="2022-05-19T22:51:11.256" v="2" actId="1076"/>
+          <ac:chgData name="Jared Fiacco" userId="e4f6bfaef04c63d1" providerId="LiveId" clId="{D38C5BE2-17A7-461C-BD94-6C0C7CDA27B5}" dt="2022-05-19T23:48:58.648" v="292" actId="1076"/>
           <ac:spMkLst>
             <pc:docMk/>
             <pc:sldMk cId="2637552424" sldId="266"/>
@@ -212,7 +269,7 @@
           </ac:spMkLst>
         </pc:spChg>
         <pc:spChg chg="mod">
-          <ac:chgData name="Jared Fiacco" userId="e4f6bfaef04c63d1" providerId="LiveId" clId="{D38C5BE2-17A7-461C-BD94-6C0C7CDA27B5}" dt="2022-05-19T22:51:11.256" v="2" actId="1076"/>
+          <ac:chgData name="Jared Fiacco" userId="e4f6bfaef04c63d1" providerId="LiveId" clId="{D38C5BE2-17A7-461C-BD94-6C0C7CDA27B5}" dt="2022-05-19T23:48:58.648" v="292" actId="1076"/>
           <ac:spMkLst>
             <pc:docMk/>
             <pc:sldMk cId="2637552424" sldId="266"/>
@@ -220,7 +277,7 @@
           </ac:spMkLst>
         </pc:spChg>
         <pc:spChg chg="mod">
-          <ac:chgData name="Jared Fiacco" userId="e4f6bfaef04c63d1" providerId="LiveId" clId="{D38C5BE2-17A7-461C-BD94-6C0C7CDA27B5}" dt="2022-05-19T22:51:11.256" v="2" actId="1076"/>
+          <ac:chgData name="Jared Fiacco" userId="e4f6bfaef04c63d1" providerId="LiveId" clId="{D38C5BE2-17A7-461C-BD94-6C0C7CDA27B5}" dt="2022-05-19T23:48:58.648" v="292" actId="1076"/>
           <ac:spMkLst>
             <pc:docMk/>
             <pc:sldMk cId="2637552424" sldId="266"/>
@@ -228,7 +285,7 @@
           </ac:spMkLst>
         </pc:spChg>
         <pc:grpChg chg="mod">
-          <ac:chgData name="Jared Fiacco" userId="e4f6bfaef04c63d1" providerId="LiveId" clId="{D38C5BE2-17A7-461C-BD94-6C0C7CDA27B5}" dt="2022-05-19T22:51:11.256" v="2" actId="1076"/>
+          <ac:chgData name="Jared Fiacco" userId="e4f6bfaef04c63d1" providerId="LiveId" clId="{D38C5BE2-17A7-461C-BD94-6C0C7CDA27B5}" dt="2022-05-19T23:48:58.648" v="292" actId="1076"/>
           <ac:grpSpMkLst>
             <pc:docMk/>
             <pc:sldMk cId="2637552424" sldId="266"/>
@@ -236,15 +293,23 @@
           </ac:grpSpMkLst>
         </pc:grpChg>
         <pc:grpChg chg="mod">
-          <ac:chgData name="Jared Fiacco" userId="e4f6bfaef04c63d1" providerId="LiveId" clId="{D38C5BE2-17A7-461C-BD94-6C0C7CDA27B5}" dt="2022-05-19T22:51:11.256" v="2" actId="1076"/>
+          <ac:chgData name="Jared Fiacco" userId="e4f6bfaef04c63d1" providerId="LiveId" clId="{D38C5BE2-17A7-461C-BD94-6C0C7CDA27B5}" dt="2022-05-19T23:48:58.648" v="292" actId="1076"/>
           <ac:grpSpMkLst>
             <pc:docMk/>
             <pc:sldMk cId="2637552424" sldId="266"/>
             <ac:grpSpMk id="11" creationId="{1576249E-C9FC-311A-810D-B600249E7A01}"/>
           </ac:grpSpMkLst>
         </pc:grpChg>
+        <pc:picChg chg="add mod">
+          <ac:chgData name="Jared Fiacco" userId="e4f6bfaef04c63d1" providerId="LiveId" clId="{D38C5BE2-17A7-461C-BD94-6C0C7CDA27B5}" dt="2022-05-19T23:48:58.648" v="292" actId="1076"/>
+          <ac:picMkLst>
+            <pc:docMk/>
+            <pc:sldMk cId="2637552424" sldId="266"/>
+            <ac:picMk id="3" creationId="{671110A7-3AA6-3342-2EFD-BC659E8CA909}"/>
+          </ac:picMkLst>
+        </pc:picChg>
         <pc:picChg chg="mod">
-          <ac:chgData name="Jared Fiacco" userId="e4f6bfaef04c63d1" providerId="LiveId" clId="{D38C5BE2-17A7-461C-BD94-6C0C7CDA27B5}" dt="2022-05-19T22:51:11.256" v="2" actId="1076"/>
+          <ac:chgData name="Jared Fiacco" userId="e4f6bfaef04c63d1" providerId="LiveId" clId="{D38C5BE2-17A7-461C-BD94-6C0C7CDA27B5}" dt="2022-05-19T23:48:58.648" v="292" actId="1076"/>
           <ac:picMkLst>
             <pc:docMk/>
             <pc:sldMk cId="2637552424" sldId="266"/>
@@ -252,7 +317,7 @@
           </ac:picMkLst>
         </pc:picChg>
         <pc:picChg chg="mod">
-          <ac:chgData name="Jared Fiacco" userId="e4f6bfaef04c63d1" providerId="LiveId" clId="{D38C5BE2-17A7-461C-BD94-6C0C7CDA27B5}" dt="2022-05-19T22:51:11.256" v="2" actId="1076"/>
+          <ac:chgData name="Jared Fiacco" userId="e4f6bfaef04c63d1" providerId="LiveId" clId="{D38C5BE2-17A7-461C-BD94-6C0C7CDA27B5}" dt="2022-05-19T23:48:58.648" v="292" actId="1076"/>
           <ac:picMkLst>
             <pc:docMk/>
             <pc:sldMk cId="2637552424" sldId="266"/>
@@ -260,7 +325,7 @@
           </ac:picMkLst>
         </pc:picChg>
         <pc:picChg chg="mod">
-          <ac:chgData name="Jared Fiacco" userId="e4f6bfaef04c63d1" providerId="LiveId" clId="{D38C5BE2-17A7-461C-BD94-6C0C7CDA27B5}" dt="2022-05-19T22:51:11.256" v="2" actId="1076"/>
+          <ac:chgData name="Jared Fiacco" userId="e4f6bfaef04c63d1" providerId="LiveId" clId="{D38C5BE2-17A7-461C-BD94-6C0C7CDA27B5}" dt="2022-05-19T23:48:58.648" v="292" actId="1076"/>
           <ac:picMkLst>
             <pc:docMk/>
             <pc:sldMk cId="2637552424" sldId="266"/>
@@ -268,7 +333,7 @@
           </ac:picMkLst>
         </pc:picChg>
         <pc:picChg chg="mod">
-          <ac:chgData name="Jared Fiacco" userId="e4f6bfaef04c63d1" providerId="LiveId" clId="{D38C5BE2-17A7-461C-BD94-6C0C7CDA27B5}" dt="2022-05-19T22:51:11.256" v="2" actId="1076"/>
+          <ac:chgData name="Jared Fiacco" userId="e4f6bfaef04c63d1" providerId="LiveId" clId="{D38C5BE2-17A7-461C-BD94-6C0C7CDA27B5}" dt="2022-05-19T23:48:58.648" v="292" actId="1076"/>
           <ac:picMkLst>
             <pc:docMk/>
             <pc:sldMk cId="2637552424" sldId="266"/>
@@ -276,7 +341,7 @@
           </ac:picMkLst>
         </pc:picChg>
         <pc:picChg chg="mod">
-          <ac:chgData name="Jared Fiacco" userId="e4f6bfaef04c63d1" providerId="LiveId" clId="{D38C5BE2-17A7-461C-BD94-6C0C7CDA27B5}" dt="2022-05-19T22:51:11.256" v="2" actId="1076"/>
+          <ac:chgData name="Jared Fiacco" userId="e4f6bfaef04c63d1" providerId="LiveId" clId="{D38C5BE2-17A7-461C-BD94-6C0C7CDA27B5}" dt="2022-05-19T23:48:58.648" v="292" actId="1076"/>
           <ac:picMkLst>
             <pc:docMk/>
             <pc:sldMk cId="2637552424" sldId="266"/>
@@ -284,7 +349,7 @@
           </ac:picMkLst>
         </pc:picChg>
         <pc:picChg chg="mod">
-          <ac:chgData name="Jared Fiacco" userId="e4f6bfaef04c63d1" providerId="LiveId" clId="{D38C5BE2-17A7-461C-BD94-6C0C7CDA27B5}" dt="2022-05-19T22:51:11.256" v="2" actId="1076"/>
+          <ac:chgData name="Jared Fiacco" userId="e4f6bfaef04c63d1" providerId="LiveId" clId="{D38C5BE2-17A7-461C-BD94-6C0C7CDA27B5}" dt="2022-05-19T23:48:58.648" v="292" actId="1076"/>
           <ac:picMkLst>
             <pc:docMk/>
             <pc:sldMk cId="2637552424" sldId="266"/>
@@ -292,7 +357,7 @@
           </ac:picMkLst>
         </pc:picChg>
         <pc:picChg chg="mod">
-          <ac:chgData name="Jared Fiacco" userId="e4f6bfaef04c63d1" providerId="LiveId" clId="{D38C5BE2-17A7-461C-BD94-6C0C7CDA27B5}" dt="2022-05-19T22:51:11.256" v="2" actId="1076"/>
+          <ac:chgData name="Jared Fiacco" userId="e4f6bfaef04c63d1" providerId="LiveId" clId="{D38C5BE2-17A7-461C-BD94-6C0C7CDA27B5}" dt="2022-05-19T23:48:58.648" v="292" actId="1076"/>
           <ac:picMkLst>
             <pc:docMk/>
             <pc:sldMk cId="2637552424" sldId="266"/>
@@ -300,7 +365,7 @@
           </ac:picMkLst>
         </pc:picChg>
         <pc:picChg chg="mod">
-          <ac:chgData name="Jared Fiacco" userId="e4f6bfaef04c63d1" providerId="LiveId" clId="{D38C5BE2-17A7-461C-BD94-6C0C7CDA27B5}" dt="2022-05-19T22:51:11.256" v="2" actId="1076"/>
+          <ac:chgData name="Jared Fiacco" userId="e4f6bfaef04c63d1" providerId="LiveId" clId="{D38C5BE2-17A7-461C-BD94-6C0C7CDA27B5}" dt="2022-05-19T23:48:58.648" v="292" actId="1076"/>
           <ac:picMkLst>
             <pc:docMk/>
             <pc:sldMk cId="2637552424" sldId="266"/>
@@ -308,7 +373,7 @@
           </ac:picMkLst>
         </pc:picChg>
         <pc:picChg chg="mod">
-          <ac:chgData name="Jared Fiacco" userId="e4f6bfaef04c63d1" providerId="LiveId" clId="{D38C5BE2-17A7-461C-BD94-6C0C7CDA27B5}" dt="2022-05-19T22:51:11.256" v="2" actId="1076"/>
+          <ac:chgData name="Jared Fiacco" userId="e4f6bfaef04c63d1" providerId="LiveId" clId="{D38C5BE2-17A7-461C-BD94-6C0C7CDA27B5}" dt="2022-05-19T23:48:58.648" v="292" actId="1076"/>
           <ac:picMkLst>
             <pc:docMk/>
             <pc:sldMk cId="2637552424" sldId="266"/>
@@ -316,7 +381,7 @@
           </ac:picMkLst>
         </pc:picChg>
         <pc:picChg chg="mod">
-          <ac:chgData name="Jared Fiacco" userId="e4f6bfaef04c63d1" providerId="LiveId" clId="{D38C5BE2-17A7-461C-BD94-6C0C7CDA27B5}" dt="2022-05-19T22:51:11.256" v="2" actId="1076"/>
+          <ac:chgData name="Jared Fiacco" userId="e4f6bfaef04c63d1" providerId="LiveId" clId="{D38C5BE2-17A7-461C-BD94-6C0C7CDA27B5}" dt="2022-05-19T23:48:58.648" v="292" actId="1076"/>
           <ac:picMkLst>
             <pc:docMk/>
             <pc:sldMk cId="2637552424" sldId="266"/>
@@ -332,7 +397,7 @@
           </ac:picMkLst>
         </pc:picChg>
         <pc:picChg chg="mod">
-          <ac:chgData name="Jared Fiacco" userId="e4f6bfaef04c63d1" providerId="LiveId" clId="{D38C5BE2-17A7-461C-BD94-6C0C7CDA27B5}" dt="2022-05-19T22:51:11.256" v="2" actId="1076"/>
+          <ac:chgData name="Jared Fiacco" userId="e4f6bfaef04c63d1" providerId="LiveId" clId="{D38C5BE2-17A7-461C-BD94-6C0C7CDA27B5}" dt="2022-05-19T23:48:58.648" v="292" actId="1076"/>
           <ac:picMkLst>
             <pc:docMk/>
             <pc:sldMk cId="2637552424" sldId="266"/>
@@ -340,7 +405,7 @@
           </ac:picMkLst>
         </pc:picChg>
         <pc:picChg chg="mod">
-          <ac:chgData name="Jared Fiacco" userId="e4f6bfaef04c63d1" providerId="LiveId" clId="{D38C5BE2-17A7-461C-BD94-6C0C7CDA27B5}" dt="2022-05-19T22:51:11.256" v="2" actId="1076"/>
+          <ac:chgData name="Jared Fiacco" userId="e4f6bfaef04c63d1" providerId="LiveId" clId="{D38C5BE2-17A7-461C-BD94-6C0C7CDA27B5}" dt="2022-05-19T23:48:58.648" v="292" actId="1076"/>
           <ac:picMkLst>
             <pc:docMk/>
             <pc:sldMk cId="2637552424" sldId="266"/>
@@ -348,7 +413,7 @@
           </ac:picMkLst>
         </pc:picChg>
         <pc:picChg chg="mod">
-          <ac:chgData name="Jared Fiacco" userId="e4f6bfaef04c63d1" providerId="LiveId" clId="{D38C5BE2-17A7-461C-BD94-6C0C7CDA27B5}" dt="2022-05-19T22:51:11.256" v="2" actId="1076"/>
+          <ac:chgData name="Jared Fiacco" userId="e4f6bfaef04c63d1" providerId="LiveId" clId="{D38C5BE2-17A7-461C-BD94-6C0C7CDA27B5}" dt="2022-05-19T23:48:58.648" v="292" actId="1076"/>
           <ac:picMkLst>
             <pc:docMk/>
             <pc:sldMk cId="2637552424" sldId="266"/>
@@ -356,7 +421,7 @@
           </ac:picMkLst>
         </pc:picChg>
         <pc:picChg chg="mod">
-          <ac:chgData name="Jared Fiacco" userId="e4f6bfaef04c63d1" providerId="LiveId" clId="{D38C5BE2-17A7-461C-BD94-6C0C7CDA27B5}" dt="2022-05-19T22:51:11.256" v="2" actId="1076"/>
+          <ac:chgData name="Jared Fiacco" userId="e4f6bfaef04c63d1" providerId="LiveId" clId="{D38C5BE2-17A7-461C-BD94-6C0C7CDA27B5}" dt="2022-05-19T23:48:58.648" v="292" actId="1076"/>
           <ac:picMkLst>
             <pc:docMk/>
             <pc:sldMk cId="2637552424" sldId="266"/>
@@ -364,7 +429,7 @@
           </ac:picMkLst>
         </pc:picChg>
         <pc:cxnChg chg="mod">
-          <ac:chgData name="Jared Fiacco" userId="e4f6bfaef04c63d1" providerId="LiveId" clId="{D38C5BE2-17A7-461C-BD94-6C0C7CDA27B5}" dt="2022-05-19T22:51:11.256" v="2" actId="1076"/>
+          <ac:chgData name="Jared Fiacco" userId="e4f6bfaef04c63d1" providerId="LiveId" clId="{D38C5BE2-17A7-461C-BD94-6C0C7CDA27B5}" dt="2022-05-19T23:48:58.648" v="292" actId="1076"/>
           <ac:cxnSpMkLst>
             <pc:docMk/>
             <pc:sldMk cId="2637552424" sldId="266"/>
@@ -372,7 +437,7 @@
           </ac:cxnSpMkLst>
         </pc:cxnChg>
         <pc:cxnChg chg="mod">
-          <ac:chgData name="Jared Fiacco" userId="e4f6bfaef04c63d1" providerId="LiveId" clId="{D38C5BE2-17A7-461C-BD94-6C0C7CDA27B5}" dt="2022-05-19T22:51:11.256" v="2" actId="1076"/>
+          <ac:chgData name="Jared Fiacco" userId="e4f6bfaef04c63d1" providerId="LiveId" clId="{D38C5BE2-17A7-461C-BD94-6C0C7CDA27B5}" dt="2022-05-19T23:48:58.648" v="292" actId="1076"/>
           <ac:cxnSpMkLst>
             <pc:docMk/>
             <pc:sldMk cId="2637552424" sldId="266"/>
@@ -380,7 +445,7 @@
           </ac:cxnSpMkLst>
         </pc:cxnChg>
         <pc:cxnChg chg="mod">
-          <ac:chgData name="Jared Fiacco" userId="e4f6bfaef04c63d1" providerId="LiveId" clId="{D38C5BE2-17A7-461C-BD94-6C0C7CDA27B5}" dt="2022-05-19T22:51:11.256" v="2" actId="1076"/>
+          <ac:chgData name="Jared Fiacco" userId="e4f6bfaef04c63d1" providerId="LiveId" clId="{D38C5BE2-17A7-461C-BD94-6C0C7CDA27B5}" dt="2022-05-19T23:48:58.648" v="292" actId="1076"/>
           <ac:cxnSpMkLst>
             <pc:docMk/>
             <pc:sldMk cId="2637552424" sldId="266"/>
@@ -388,7 +453,7 @@
           </ac:cxnSpMkLst>
         </pc:cxnChg>
         <pc:cxnChg chg="mod">
-          <ac:chgData name="Jared Fiacco" userId="e4f6bfaef04c63d1" providerId="LiveId" clId="{D38C5BE2-17A7-461C-BD94-6C0C7CDA27B5}" dt="2022-05-19T22:51:11.256" v="2" actId="1076"/>
+          <ac:chgData name="Jared Fiacco" userId="e4f6bfaef04c63d1" providerId="LiveId" clId="{D38C5BE2-17A7-461C-BD94-6C0C7CDA27B5}" dt="2022-05-19T23:48:58.648" v="292" actId="1076"/>
           <ac:cxnSpMkLst>
             <pc:docMk/>
             <pc:sldMk cId="2637552424" sldId="266"/>
@@ -396,7 +461,7 @@
           </ac:cxnSpMkLst>
         </pc:cxnChg>
         <pc:cxnChg chg="mod">
-          <ac:chgData name="Jared Fiacco" userId="e4f6bfaef04c63d1" providerId="LiveId" clId="{D38C5BE2-17A7-461C-BD94-6C0C7CDA27B5}" dt="2022-05-19T22:51:11.256" v="2" actId="1076"/>
+          <ac:chgData name="Jared Fiacco" userId="e4f6bfaef04c63d1" providerId="LiveId" clId="{D38C5BE2-17A7-461C-BD94-6C0C7CDA27B5}" dt="2022-05-19T23:48:58.648" v="292" actId="1076"/>
           <ac:cxnSpMkLst>
             <pc:docMk/>
             <pc:sldMk cId="2637552424" sldId="266"/>
@@ -404,7 +469,7 @@
           </ac:cxnSpMkLst>
         </pc:cxnChg>
         <pc:cxnChg chg="mod">
-          <ac:chgData name="Jared Fiacco" userId="e4f6bfaef04c63d1" providerId="LiveId" clId="{D38C5BE2-17A7-461C-BD94-6C0C7CDA27B5}" dt="2022-05-19T22:51:11.256" v="2" actId="1076"/>
+          <ac:chgData name="Jared Fiacco" userId="e4f6bfaef04c63d1" providerId="LiveId" clId="{D38C5BE2-17A7-461C-BD94-6C0C7CDA27B5}" dt="2022-05-19T23:48:58.648" v="292" actId="1076"/>
           <ac:cxnSpMkLst>
             <pc:docMk/>
             <pc:sldMk cId="2637552424" sldId="266"/>
@@ -412,7 +477,7 @@
           </ac:cxnSpMkLst>
         </pc:cxnChg>
         <pc:cxnChg chg="mod">
-          <ac:chgData name="Jared Fiacco" userId="e4f6bfaef04c63d1" providerId="LiveId" clId="{D38C5BE2-17A7-461C-BD94-6C0C7CDA27B5}" dt="2022-05-19T22:51:11.256" v="2" actId="1076"/>
+          <ac:chgData name="Jared Fiacco" userId="e4f6bfaef04c63d1" providerId="LiveId" clId="{D38C5BE2-17A7-461C-BD94-6C0C7CDA27B5}" dt="2022-05-19T23:48:58.648" v="292" actId="1076"/>
           <ac:cxnSpMkLst>
             <pc:docMk/>
             <pc:sldMk cId="2637552424" sldId="266"/>
@@ -420,13 +485,268 @@
           </ac:cxnSpMkLst>
         </pc:cxnChg>
         <pc:cxnChg chg="mod">
-          <ac:chgData name="Jared Fiacco" userId="e4f6bfaef04c63d1" providerId="LiveId" clId="{D38C5BE2-17A7-461C-BD94-6C0C7CDA27B5}" dt="2022-05-19T22:51:11.256" v="2" actId="1076"/>
+          <ac:chgData name="Jared Fiacco" userId="e4f6bfaef04c63d1" providerId="LiveId" clId="{D38C5BE2-17A7-461C-BD94-6C0C7CDA27B5}" dt="2022-05-19T23:48:58.648" v="292" actId="1076"/>
           <ac:cxnSpMkLst>
             <pc:docMk/>
             <pc:sldMk cId="2637552424" sldId="266"/>
             <ac:cxnSpMk id="87" creationId="{2631579E-EA0D-4C22-9086-ADA4FA144BDB}"/>
           </ac:cxnSpMkLst>
         </pc:cxnChg>
+      </pc:sldChg>
+      <pc:sldChg chg="addSp delSp mod">
+        <pc:chgData name="Jared Fiacco" userId="e4f6bfaef04c63d1" providerId="LiveId" clId="{D38C5BE2-17A7-461C-BD94-6C0C7CDA27B5}" dt="2022-05-20T00:12:23.220" v="305" actId="22"/>
+        <pc:sldMkLst>
+          <pc:docMk/>
+          <pc:sldMk cId="849574699" sldId="267"/>
+        </pc:sldMkLst>
+        <pc:picChg chg="add">
+          <ac:chgData name="Jared Fiacco" userId="e4f6bfaef04c63d1" providerId="LiveId" clId="{D38C5BE2-17A7-461C-BD94-6C0C7CDA27B5}" dt="2022-05-20T00:12:23.220" v="305" actId="22"/>
+          <ac:picMkLst>
+            <pc:docMk/>
+            <pc:sldMk cId="849574699" sldId="267"/>
+            <ac:picMk id="3" creationId="{A06B3056-A351-5E3C-1100-7273ABB4EDB3}"/>
+          </ac:picMkLst>
+        </pc:picChg>
+        <pc:picChg chg="del">
+          <ac:chgData name="Jared Fiacco" userId="e4f6bfaef04c63d1" providerId="LiveId" clId="{D38C5BE2-17A7-461C-BD94-6C0C7CDA27B5}" dt="2022-05-19T23:49:27.479" v="304" actId="478"/>
+          <ac:picMkLst>
+            <pc:docMk/>
+            <pc:sldMk cId="849574699" sldId="267"/>
+            <ac:picMk id="7" creationId="{A8AC5FA5-8930-43E2-86E6-FF4CEC75DE67}"/>
+          </ac:picMkLst>
+        </pc:picChg>
+      </pc:sldChg>
+      <pc:sldChg chg="addSp delSp modSp add mod">
+        <pc:chgData name="Jared Fiacco" userId="e4f6bfaef04c63d1" providerId="LiveId" clId="{D38C5BE2-17A7-461C-BD94-6C0C7CDA27B5}" dt="2022-05-20T00:19:17.927" v="312"/>
+        <pc:sldMkLst>
+          <pc:docMk/>
+          <pc:sldMk cId="1501980821" sldId="268"/>
+        </pc:sldMkLst>
+        <pc:picChg chg="del">
+          <ac:chgData name="Jared Fiacco" userId="e4f6bfaef04c63d1" providerId="LiveId" clId="{D38C5BE2-17A7-461C-BD94-6C0C7CDA27B5}" dt="2022-05-20T00:14:50.005" v="307" actId="478"/>
+          <ac:picMkLst>
+            <pc:docMk/>
+            <pc:sldMk cId="1501980821" sldId="268"/>
+            <ac:picMk id="3" creationId="{A06B3056-A351-5E3C-1100-7273ABB4EDB3}"/>
+          </ac:picMkLst>
+        </pc:picChg>
+        <pc:picChg chg="add">
+          <ac:chgData name="Jared Fiacco" userId="e4f6bfaef04c63d1" providerId="LiveId" clId="{D38C5BE2-17A7-461C-BD94-6C0C7CDA27B5}" dt="2022-05-20T00:14:54.135" v="310" actId="22"/>
+          <ac:picMkLst>
+            <pc:docMk/>
+            <pc:sldMk cId="1501980821" sldId="268"/>
+            <ac:picMk id="4" creationId="{35E729E3-65F0-D47A-B267-E1ECAB397BC3}"/>
+          </ac:picMkLst>
+        </pc:picChg>
+        <pc:picChg chg="add del mod">
+          <ac:chgData name="Jared Fiacco" userId="e4f6bfaef04c63d1" providerId="LiveId" clId="{D38C5BE2-17A7-461C-BD94-6C0C7CDA27B5}" dt="2022-05-20T00:19:17.927" v="312"/>
+          <ac:picMkLst>
+            <pc:docMk/>
+            <pc:sldMk cId="1501980821" sldId="268"/>
+            <ac:picMk id="5" creationId="{4C744039-97E1-1C32-390F-4294C7030969}"/>
+          </ac:picMkLst>
+        </pc:picChg>
+      </pc:sldChg>
+      <pc:sldChg chg="del">
+        <pc:chgData name="Jared Fiacco" userId="e4f6bfaef04c63d1" providerId="LiveId" clId="{D38C5BE2-17A7-461C-BD94-6C0C7CDA27B5}" dt="2022-05-19T23:49:22.568" v="298" actId="47"/>
+        <pc:sldMkLst>
+          <pc:docMk/>
+          <pc:sldMk cId="3261590427" sldId="268"/>
+        </pc:sldMkLst>
+      </pc:sldChg>
+      <pc:sldChg chg="addSp delSp modSp add mod">
+        <pc:chgData name="Jared Fiacco" userId="e4f6bfaef04c63d1" providerId="LiveId" clId="{D38C5BE2-17A7-461C-BD94-6C0C7CDA27B5}" dt="2022-05-20T00:22:50.637" v="342"/>
+        <pc:sldMkLst>
+          <pc:docMk/>
+          <pc:sldMk cId="399489823" sldId="269"/>
+        </pc:sldMkLst>
+        <pc:spChg chg="add mod">
+          <ac:chgData name="Jared Fiacco" userId="e4f6bfaef04c63d1" providerId="LiveId" clId="{D38C5BE2-17A7-461C-BD94-6C0C7CDA27B5}" dt="2022-05-20T00:19:59.261" v="326" actId="14100"/>
+          <ac:spMkLst>
+            <pc:docMk/>
+            <pc:sldMk cId="399489823" sldId="269"/>
+            <ac:spMk id="9" creationId="{A8AFBAB6-A0A4-29D3-CD41-B1F7DA271134}"/>
+          </ac:spMkLst>
+        </pc:spChg>
+        <pc:spChg chg="add mod">
+          <ac:chgData name="Jared Fiacco" userId="e4f6bfaef04c63d1" providerId="LiveId" clId="{D38C5BE2-17A7-461C-BD94-6C0C7CDA27B5}" dt="2022-05-20T00:20:13.282" v="333" actId="14100"/>
+          <ac:spMkLst>
+            <pc:docMk/>
+            <pc:sldMk cId="399489823" sldId="269"/>
+            <ac:spMk id="12" creationId="{55647193-1FED-3C1C-E877-A2D65728646D}"/>
+          </ac:spMkLst>
+        </pc:spChg>
+        <pc:spChg chg="add mod">
+          <ac:chgData name="Jared Fiacco" userId="e4f6bfaef04c63d1" providerId="LiveId" clId="{D38C5BE2-17A7-461C-BD94-6C0C7CDA27B5}" dt="2022-05-20T00:20:23.159" v="336" actId="14100"/>
+          <ac:spMkLst>
+            <pc:docMk/>
+            <pc:sldMk cId="399489823" sldId="269"/>
+            <ac:spMk id="13" creationId="{C0817E1B-A8E4-69A4-0504-6E8B05F6CF7E}"/>
+          </ac:spMkLst>
+        </pc:spChg>
+        <pc:spChg chg="add mod">
+          <ac:chgData name="Jared Fiacco" userId="e4f6bfaef04c63d1" providerId="LiveId" clId="{D38C5BE2-17A7-461C-BD94-6C0C7CDA27B5}" dt="2022-05-20T00:20:35.104" v="340" actId="14100"/>
+          <ac:spMkLst>
+            <pc:docMk/>
+            <pc:sldMk cId="399489823" sldId="269"/>
+            <ac:spMk id="14" creationId="{88B6E0A7-6914-FD27-B0E2-9599EA29BAB4}"/>
+          </ac:spMkLst>
+        </pc:spChg>
+        <pc:spChg chg="add del mod">
+          <ac:chgData name="Jared Fiacco" userId="e4f6bfaef04c63d1" providerId="LiveId" clId="{D38C5BE2-17A7-461C-BD94-6C0C7CDA27B5}" dt="2022-05-20T00:22:50.637" v="342"/>
+          <ac:spMkLst>
+            <pc:docMk/>
+            <pc:sldMk cId="399489823" sldId="269"/>
+            <ac:spMk id="16" creationId="{500D58B0-BA5A-9827-BB89-1B2089B27792}"/>
+          </ac:spMkLst>
+        </pc:spChg>
+        <pc:spChg chg="add del mod">
+          <ac:chgData name="Jared Fiacco" userId="e4f6bfaef04c63d1" providerId="LiveId" clId="{D38C5BE2-17A7-461C-BD94-6C0C7CDA27B5}" dt="2022-05-20T00:22:50.637" v="342"/>
+          <ac:spMkLst>
+            <pc:docMk/>
+            <pc:sldMk cId="399489823" sldId="269"/>
+            <ac:spMk id="17" creationId="{F44F2773-F2B2-5547-7AC4-54C1E54EADF0}"/>
+          </ac:spMkLst>
+        </pc:spChg>
+        <pc:spChg chg="add del mod">
+          <ac:chgData name="Jared Fiacco" userId="e4f6bfaef04c63d1" providerId="LiveId" clId="{D38C5BE2-17A7-461C-BD94-6C0C7CDA27B5}" dt="2022-05-20T00:22:50.637" v="342"/>
+          <ac:spMkLst>
+            <pc:docMk/>
+            <pc:sldMk cId="399489823" sldId="269"/>
+            <ac:spMk id="18" creationId="{E80B701D-9885-1A27-D640-F602A748DEE9}"/>
+          </ac:spMkLst>
+        </pc:spChg>
+        <pc:spChg chg="add del mod">
+          <ac:chgData name="Jared Fiacco" userId="e4f6bfaef04c63d1" providerId="LiveId" clId="{D38C5BE2-17A7-461C-BD94-6C0C7CDA27B5}" dt="2022-05-20T00:22:50.637" v="342"/>
+          <ac:spMkLst>
+            <pc:docMk/>
+            <pc:sldMk cId="399489823" sldId="269"/>
+            <ac:spMk id="19" creationId="{DD6DB801-9764-ED82-3928-4671FB1BE345}"/>
+          </ac:spMkLst>
+        </pc:spChg>
+        <pc:picChg chg="add del">
+          <ac:chgData name="Jared Fiacco" userId="e4f6bfaef04c63d1" providerId="LiveId" clId="{D38C5BE2-17A7-461C-BD94-6C0C7CDA27B5}" dt="2022-05-20T00:19:24.839" v="316" actId="22"/>
+          <ac:picMkLst>
+            <pc:docMk/>
+            <pc:sldMk cId="399489823" sldId="269"/>
+            <ac:picMk id="3" creationId="{3951A4D2-BC73-CB23-0E69-E818123D70F2}"/>
+          </ac:picMkLst>
+        </pc:picChg>
+        <pc:picChg chg="del">
+          <ac:chgData name="Jared Fiacco" userId="e4f6bfaef04c63d1" providerId="LiveId" clId="{D38C5BE2-17A7-461C-BD94-6C0C7CDA27B5}" dt="2022-05-20T00:19:21.568" v="314" actId="478"/>
+          <ac:picMkLst>
+            <pc:docMk/>
+            <pc:sldMk cId="399489823" sldId="269"/>
+            <ac:picMk id="4" creationId="{35E729E3-65F0-D47A-B267-E1ECAB397BC3}"/>
+          </ac:picMkLst>
+        </pc:picChg>
+        <pc:picChg chg="add del">
+          <ac:chgData name="Jared Fiacco" userId="e4f6bfaef04c63d1" providerId="LiveId" clId="{D38C5BE2-17A7-461C-BD94-6C0C7CDA27B5}" dt="2022-05-20T00:19:28.216" v="318" actId="22"/>
+          <ac:picMkLst>
+            <pc:docMk/>
+            <pc:sldMk cId="399489823" sldId="269"/>
+            <ac:picMk id="6" creationId="{A77AD850-DE3E-FFE9-03ED-A17367380A5D}"/>
+          </ac:picMkLst>
+        </pc:picChg>
+        <pc:picChg chg="add mod">
+          <ac:chgData name="Jared Fiacco" userId="e4f6bfaef04c63d1" providerId="LiveId" clId="{D38C5BE2-17A7-461C-BD94-6C0C7CDA27B5}" dt="2022-05-20T00:20:04.618" v="331" actId="1076"/>
+          <ac:picMkLst>
+            <pc:docMk/>
+            <pc:sldMk cId="399489823" sldId="269"/>
+            <ac:picMk id="8" creationId="{95455ED1-8A22-E4D4-3DB2-DC59088B72C2}"/>
+          </ac:picMkLst>
+        </pc:picChg>
+        <pc:picChg chg="add del">
+          <ac:chgData name="Jared Fiacco" userId="e4f6bfaef04c63d1" providerId="LiveId" clId="{D38C5BE2-17A7-461C-BD94-6C0C7CDA27B5}" dt="2022-05-20T00:20:01.420" v="328" actId="22"/>
+          <ac:picMkLst>
+            <pc:docMk/>
+            <pc:sldMk cId="399489823" sldId="269"/>
+            <ac:picMk id="11" creationId="{BCA2E09A-B02B-9DA3-9E23-F2B0448F15B4}"/>
+          </ac:picMkLst>
+        </pc:picChg>
+        <pc:picChg chg="add del mod">
+          <ac:chgData name="Jared Fiacco" userId="e4f6bfaef04c63d1" providerId="LiveId" clId="{D38C5BE2-17A7-461C-BD94-6C0C7CDA27B5}" dt="2022-05-20T00:22:50.637" v="342"/>
+          <ac:picMkLst>
+            <pc:docMk/>
+            <pc:sldMk cId="399489823" sldId="269"/>
+            <ac:picMk id="15" creationId="{E174C605-EDEA-F6F1-3EC3-99B29BB961F3}"/>
+          </ac:picMkLst>
+        </pc:picChg>
+      </pc:sldChg>
+      <pc:sldChg chg="add del">
+        <pc:chgData name="Jared Fiacco" userId="e4f6bfaef04c63d1" providerId="LiveId" clId="{D38C5BE2-17A7-461C-BD94-6C0C7CDA27B5}" dt="2022-05-20T00:14:51.646" v="309"/>
+        <pc:sldMkLst>
+          <pc:docMk/>
+          <pc:sldMk cId="948636279" sldId="269"/>
+        </pc:sldMkLst>
+      </pc:sldChg>
+      <pc:sldChg chg="del">
+        <pc:chgData name="Jared Fiacco" userId="e4f6bfaef04c63d1" providerId="LiveId" clId="{D38C5BE2-17A7-461C-BD94-6C0C7CDA27B5}" dt="2022-05-19T23:49:22.962" v="299" actId="47"/>
+        <pc:sldMkLst>
+          <pc:docMk/>
+          <pc:sldMk cId="1250587808" sldId="269"/>
+        </pc:sldMkLst>
+      </pc:sldChg>
+      <pc:sldChg chg="del">
+        <pc:chgData name="Jared Fiacco" userId="e4f6bfaef04c63d1" providerId="LiveId" clId="{D38C5BE2-17A7-461C-BD94-6C0C7CDA27B5}" dt="2022-05-19T23:49:23.299" v="300" actId="47"/>
+        <pc:sldMkLst>
+          <pc:docMk/>
+          <pc:sldMk cId="2998061435" sldId="270"/>
+        </pc:sldMkLst>
+      </pc:sldChg>
+      <pc:sldChg chg="delSp add mod">
+        <pc:chgData name="Jared Fiacco" userId="e4f6bfaef04c63d1" providerId="LiveId" clId="{D38C5BE2-17A7-461C-BD94-6C0C7CDA27B5}" dt="2022-05-20T00:23:04.046" v="344" actId="478"/>
+        <pc:sldMkLst>
+          <pc:docMk/>
+          <pc:sldMk cId="3623422223" sldId="270"/>
+        </pc:sldMkLst>
+        <pc:spChg chg="del">
+          <ac:chgData name="Jared Fiacco" userId="e4f6bfaef04c63d1" providerId="LiveId" clId="{D38C5BE2-17A7-461C-BD94-6C0C7CDA27B5}" dt="2022-05-20T00:23:04.046" v="344" actId="478"/>
+          <ac:spMkLst>
+            <pc:docMk/>
+            <pc:sldMk cId="3623422223" sldId="270"/>
+            <ac:spMk id="9" creationId="{A8AFBAB6-A0A4-29D3-CD41-B1F7DA271134}"/>
+          </ac:spMkLst>
+        </pc:spChg>
+        <pc:spChg chg="del">
+          <ac:chgData name="Jared Fiacco" userId="e4f6bfaef04c63d1" providerId="LiveId" clId="{D38C5BE2-17A7-461C-BD94-6C0C7CDA27B5}" dt="2022-05-20T00:23:04.046" v="344" actId="478"/>
+          <ac:spMkLst>
+            <pc:docMk/>
+            <pc:sldMk cId="3623422223" sldId="270"/>
+            <ac:spMk id="12" creationId="{55647193-1FED-3C1C-E877-A2D65728646D}"/>
+          </ac:spMkLst>
+        </pc:spChg>
+        <pc:spChg chg="del">
+          <ac:chgData name="Jared Fiacco" userId="e4f6bfaef04c63d1" providerId="LiveId" clId="{D38C5BE2-17A7-461C-BD94-6C0C7CDA27B5}" dt="2022-05-20T00:23:04.046" v="344" actId="478"/>
+          <ac:spMkLst>
+            <pc:docMk/>
+            <pc:sldMk cId="3623422223" sldId="270"/>
+            <ac:spMk id="13" creationId="{C0817E1B-A8E4-69A4-0504-6E8B05F6CF7E}"/>
+          </ac:spMkLst>
+        </pc:spChg>
+        <pc:spChg chg="del">
+          <ac:chgData name="Jared Fiacco" userId="e4f6bfaef04c63d1" providerId="LiveId" clId="{D38C5BE2-17A7-461C-BD94-6C0C7CDA27B5}" dt="2022-05-20T00:23:04.046" v="344" actId="478"/>
+          <ac:spMkLst>
+            <pc:docMk/>
+            <pc:sldMk cId="3623422223" sldId="270"/>
+            <ac:spMk id="14" creationId="{88B6E0A7-6914-FD27-B0E2-9599EA29BAB4}"/>
+          </ac:spMkLst>
+        </pc:spChg>
+        <pc:picChg chg="del">
+          <ac:chgData name="Jared Fiacco" userId="e4f6bfaef04c63d1" providerId="LiveId" clId="{D38C5BE2-17A7-461C-BD94-6C0C7CDA27B5}" dt="2022-05-20T00:23:04.046" v="344" actId="478"/>
+          <ac:picMkLst>
+            <pc:docMk/>
+            <pc:sldMk cId="3623422223" sldId="270"/>
+            <ac:picMk id="8" creationId="{95455ED1-8A22-E4D4-3DB2-DC59088B72C2}"/>
+          </ac:picMkLst>
+        </pc:picChg>
+      </pc:sldChg>
+      <pc:sldChg chg="del">
+        <pc:chgData name="Jared Fiacco" userId="e4f6bfaef04c63d1" providerId="LiveId" clId="{D38C5BE2-17A7-461C-BD94-6C0C7CDA27B5}" dt="2022-05-19T23:49:24.592" v="302" actId="47"/>
+        <pc:sldMkLst>
+          <pc:docMk/>
+          <pc:sldMk cId="1205139507" sldId="271"/>
+        </pc:sldMkLst>
       </pc:sldChg>
     </pc:docChg>
   </pc:docChgLst>
@@ -3996,8 +4316,8 @@
         </p:nvSpPr>
         <p:spPr>
           <a:xfrm>
-            <a:off x="188269" y="695826"/>
-            <a:ext cx="6537296" cy="4552219"/>
+            <a:off x="355183" y="926296"/>
+            <a:ext cx="6537296" cy="5330491"/>
           </a:xfrm>
           <a:prstGeom prst="rect">
             <a:avLst/>
@@ -4046,10 +4366,10 @@
       </p:sp>
       <p:sp>
         <p:nvSpPr>
-          <p:cNvPr id="41" name="Arrow: Curved Left 40">
-            <a:extLst>
-              <a:ext uri="{FF2B5EF4-FFF2-40B4-BE49-F238E27FC236}">
-                <a16:creationId xmlns:a16="http://schemas.microsoft.com/office/drawing/2014/main" id="{3C06F8D7-9F68-4789-B25E-FD9DA1513E71}"/>
+          <p:cNvPr id="7" name="Isosceles Triangle 6">
+            <a:extLst>
+              <a:ext uri="{FF2B5EF4-FFF2-40B4-BE49-F238E27FC236}">
+                <a16:creationId xmlns:a16="http://schemas.microsoft.com/office/drawing/2014/main" id="{DC8B8C25-E888-B12C-0492-5ED76DA79D84}"/>
               </a:ext>
             </a:extLst>
           </p:cNvPr>
@@ -4057,9 +4377,78 @@
           <p:nvPr/>
         </p:nvSpPr>
         <p:spPr>
+          <a:xfrm rot="14591827" flipV="1">
+            <a:off x="3777849" y="2172630"/>
+            <a:ext cx="2021238" cy="2156098"/>
+          </a:xfrm>
+          <a:prstGeom prst="triangle">
+            <a:avLst/>
+          </a:prstGeom>
+          <a:gradFill>
+            <a:gsLst>
+              <a:gs pos="0">
+                <a:schemeClr val="accent1">
+                  <a:lumMod val="5000"/>
+                  <a:lumOff val="95000"/>
+                </a:schemeClr>
+              </a:gs>
+              <a:gs pos="50000">
+                <a:srgbClr val="5294CF"/>
+              </a:gs>
+              <a:gs pos="82000">
+                <a:srgbClr val="2D72B8"/>
+              </a:gs>
+              <a:gs pos="100000">
+                <a:srgbClr val="205B98"/>
+              </a:gs>
+            </a:gsLst>
+            <a:lin ang="5400000" scaled="1"/>
+          </a:gradFill>
+          <a:ln>
+            <a:noFill/>
+          </a:ln>
+        </p:spPr>
+        <p:style>
+          <a:lnRef idx="2">
+            <a:schemeClr val="accent1">
+              <a:shade val="50000"/>
+            </a:schemeClr>
+          </a:lnRef>
+          <a:fillRef idx="1">
+            <a:schemeClr val="accent1"/>
+          </a:fillRef>
+          <a:effectRef idx="0">
+            <a:schemeClr val="accent1"/>
+          </a:effectRef>
+          <a:fontRef idx="minor">
+            <a:schemeClr val="lt1"/>
+          </a:fontRef>
+        </p:style>
+        <p:txBody>
+          <a:bodyPr rtlCol="0" anchor="ctr"/>
+          <a:lstStyle/>
+          <a:p>
+            <a:pPr algn="ctr"/>
+            <a:endParaRPr lang="en-US"/>
+          </a:p>
+        </p:txBody>
+      </p:sp>
+      <p:sp>
+        <p:nvSpPr>
+          <p:cNvPr id="41" name="Arrow: Curved Left 40">
+            <a:extLst>
+              <a:ext uri="{FF2B5EF4-FFF2-40B4-BE49-F238E27FC236}">
+                <a16:creationId xmlns:a16="http://schemas.microsoft.com/office/drawing/2014/main" id="{3C06F8D7-9F68-4789-B25E-FD9DA1513E71}"/>
+              </a:ext>
+            </a:extLst>
+          </p:cNvPr>
+          <p:cNvSpPr/>
+          <p:nvPr/>
+        </p:nvSpPr>
+        <p:spPr>
           <a:xfrm rot="15829040" flipV="1">
-            <a:off x="7361905" y="1010216"/>
-            <a:ext cx="398534" cy="3991667"/>
+            <a:off x="7183520" y="2446686"/>
+            <a:ext cx="398534" cy="3232072"/>
           </a:xfrm>
           <a:prstGeom prst="curvedLeftArrow">
             <a:avLst>
@@ -4122,7 +4511,7 @@
         </p:nvCxnSpPr>
         <p:spPr>
           <a:xfrm flipV="1">
-            <a:off x="6177309" y="4117756"/>
+            <a:off x="6344223" y="5126498"/>
             <a:ext cx="2091358" cy="4638"/>
           </a:xfrm>
           <a:prstGeom prst="straightConnector1">
@@ -4166,7 +4555,7 @@
         </p:nvCxnSpPr>
         <p:spPr>
           <a:xfrm>
-            <a:off x="1182133" y="2282516"/>
+            <a:off x="1349047" y="3291258"/>
             <a:ext cx="14566" cy="1206849"/>
           </a:xfrm>
           <a:prstGeom prst="straightConnector1">
@@ -4208,7 +4597,7 @@
         </p:nvGrpSpPr>
         <p:grpSpPr>
           <a:xfrm>
-            <a:off x="4561535" y="3434407"/>
+            <a:off x="4728449" y="4443149"/>
             <a:ext cx="1965846" cy="1536205"/>
             <a:chOff x="3343002" y="3461920"/>
             <a:chExt cx="1965846" cy="1536205"/>
@@ -4366,7 +4755,7 @@
         </p:nvSpPr>
         <p:spPr>
           <a:xfrm>
-            <a:off x="4803406" y="672980"/>
+            <a:off x="4895850" y="1694130"/>
             <a:ext cx="1524013" cy="400110"/>
           </a:xfrm>
           <a:prstGeom prst="rect">
@@ -4406,7 +4795,7 @@
         </p:nvSpPr>
         <p:spPr>
           <a:xfrm>
-            <a:off x="614935" y="4603352"/>
+            <a:off x="781849" y="5612094"/>
             <a:ext cx="1161248" cy="400110"/>
           </a:xfrm>
           <a:prstGeom prst="rect">
@@ -4446,7 +4835,7 @@
         </p:nvSpPr>
         <p:spPr>
           <a:xfrm>
-            <a:off x="445845" y="774919"/>
+            <a:off x="612759" y="1783661"/>
             <a:ext cx="1582787" cy="400110"/>
           </a:xfrm>
           <a:prstGeom prst="rect">
@@ -4488,7 +4877,7 @@
         </p:nvCxnSpPr>
         <p:spPr>
           <a:xfrm>
-            <a:off x="1844757" y="4085983"/>
+            <a:off x="2011671" y="5094725"/>
             <a:ext cx="873863" cy="0"/>
           </a:xfrm>
           <a:prstGeom prst="straightConnector1">
@@ -4532,7 +4921,7 @@
         </p:nvCxnSpPr>
         <p:spPr>
           <a:xfrm flipV="1">
-            <a:off x="5479604" y="2044813"/>
+            <a:off x="5646518" y="3053555"/>
             <a:ext cx="11339" cy="1358997"/>
           </a:xfrm>
           <a:prstGeom prst="straightConnector1">
@@ -4591,7 +4980,7 @@
         </p:blipFill>
         <p:spPr>
           <a:xfrm>
-            <a:off x="6630569" y="1092789"/>
+            <a:off x="6797483" y="2101531"/>
             <a:ext cx="904978" cy="904978"/>
           </a:xfrm>
           <a:prstGeom prst="rect">
@@ -4613,7 +5002,7 @@
         </p:nvSpPr>
         <p:spPr>
           <a:xfrm>
-            <a:off x="7199486" y="1334511"/>
+            <a:off x="7366400" y="2343253"/>
             <a:ext cx="1618014" cy="400110"/>
           </a:xfrm>
           <a:prstGeom prst="rect">
@@ -4656,7 +5045,7 @@
         </p:nvCxnSpPr>
         <p:spPr>
           <a:xfrm>
-            <a:off x="6061652" y="1544836"/>
+            <a:off x="6228566" y="2553578"/>
             <a:ext cx="568917" cy="442"/>
           </a:xfrm>
           <a:prstGeom prst="straightConnector1">
@@ -4713,7 +5102,7 @@
         </p:blipFill>
         <p:spPr bwMode="auto">
           <a:xfrm>
-            <a:off x="9331674" y="1180394"/>
+            <a:off x="9498588" y="2189136"/>
             <a:ext cx="1010913" cy="754501"/>
           </a:xfrm>
           <a:prstGeom prst="rect">
@@ -4747,7 +5136,7 @@
         </p:nvCxnSpPr>
         <p:spPr>
           <a:xfrm flipV="1">
-            <a:off x="8732760" y="1534566"/>
+            <a:off x="8899674" y="2543308"/>
             <a:ext cx="501644" cy="2457"/>
           </a:xfrm>
           <a:prstGeom prst="straightConnector1">
@@ -4791,7 +5180,7 @@
         </p:nvCxnSpPr>
         <p:spPr>
           <a:xfrm flipV="1">
-            <a:off x="10426546" y="1532109"/>
+            <a:off x="10593460" y="2540851"/>
             <a:ext cx="501644" cy="2457"/>
           </a:xfrm>
           <a:prstGeom prst="straightConnector1">
@@ -4833,7 +5222,7 @@
         </p:nvSpPr>
         <p:spPr>
           <a:xfrm>
-            <a:off x="7954910" y="556459"/>
+            <a:off x="8356207" y="1810179"/>
             <a:ext cx="3408604" cy="338554"/>
           </a:xfrm>
           <a:prstGeom prst="rect">
@@ -4888,7 +5277,7 @@
         </p:blipFill>
         <p:spPr bwMode="auto">
           <a:xfrm>
-            <a:off x="4985874" y="996333"/>
+            <a:off x="5152788" y="2005075"/>
             <a:ext cx="1016476" cy="1050901"/>
           </a:xfrm>
           <a:prstGeom prst="rect">
@@ -4933,7 +5322,7 @@
         </p:blipFill>
         <p:spPr bwMode="auto">
           <a:xfrm>
-            <a:off x="679766" y="3559006"/>
+            <a:off x="846680" y="4567748"/>
             <a:ext cx="1114946" cy="1025438"/>
           </a:xfrm>
           <a:prstGeom prst="rect">
@@ -4980,7 +5369,7 @@
         </p:blipFill>
         <p:spPr bwMode="auto">
           <a:xfrm>
-            <a:off x="694379" y="1122521"/>
+            <a:off x="861293" y="2131263"/>
             <a:ext cx="975507" cy="1105216"/>
           </a:xfrm>
           <a:prstGeom prst="rect">
@@ -5025,7 +5414,7 @@
         </p:blipFill>
         <p:spPr bwMode="auto">
           <a:xfrm>
-            <a:off x="2801892" y="3403810"/>
+            <a:off x="2968806" y="4412552"/>
             <a:ext cx="1297135" cy="1428745"/>
           </a:xfrm>
           <a:prstGeom prst="rect">
@@ -5072,7 +5461,7 @@
         </p:blipFill>
         <p:spPr bwMode="auto">
           <a:xfrm>
-            <a:off x="2697269" y="1157727"/>
+            <a:off x="2955782" y="1094353"/>
             <a:ext cx="1336098" cy="799832"/>
           </a:xfrm>
           <a:prstGeom prst="rect">
@@ -5104,7 +5493,7 @@
         </p:nvSpPr>
         <p:spPr>
           <a:xfrm>
-            <a:off x="3129497" y="4750423"/>
+            <a:off x="3296411" y="5759165"/>
             <a:ext cx="632102" cy="400110"/>
           </a:xfrm>
           <a:prstGeom prst="rect">
@@ -5144,7 +5533,7 @@
         </p:nvGrpSpPr>
         <p:grpSpPr>
           <a:xfrm>
-            <a:off x="7931239" y="2981831"/>
+            <a:off x="8488685" y="3071188"/>
             <a:ext cx="3105223" cy="3461043"/>
             <a:chOff x="8991153" y="3167002"/>
             <a:chExt cx="3105223" cy="3461043"/>
@@ -5442,7 +5831,7 @@
         </p:nvCxnSpPr>
         <p:spPr>
           <a:xfrm>
-            <a:off x="4044975" y="4077009"/>
+            <a:off x="4211889" y="5085751"/>
             <a:ext cx="873863" cy="0"/>
           </a:xfrm>
           <a:prstGeom prst="straightConnector1">
@@ -5470,42 +5859,12 @@
           </a:fontRef>
         </p:style>
       </p:cxnSp>
-    </p:spTree>
-    <p:extLst>
-      <p:ext uri="{BB962C8B-B14F-4D97-AF65-F5344CB8AC3E}">
-        <p14:creationId xmlns:p14="http://schemas.microsoft.com/office/powerpoint/2010/main" val="2637552424"/>
-      </p:ext>
-    </p:extLst>
-  </p:cSld>
-  <p:clrMapOvr>
-    <a:masterClrMapping/>
-  </p:clrMapOvr>
-</p:sld>
-</file>
-
-<file path=ppt/slides/slide10.xml><?xml version="1.0" encoding="utf-8"?>
-<p:sld xmlns:a="http://schemas.openxmlformats.org/drawingml/2006/main" xmlns:r="http://schemas.openxmlformats.org/officeDocument/2006/relationships" xmlns:p="http://schemas.openxmlformats.org/presentationml/2006/main">
-  <p:cSld>
-    <p:spTree>
-      <p:nvGrpSpPr>
-        <p:cNvPr id="1" name=""/>
-        <p:cNvGrpSpPr/>
-        <p:nvPr/>
-      </p:nvGrpSpPr>
-      <p:grpSpPr>
-        <a:xfrm>
-          <a:off x="0" y="0"/>
-          <a:ext cx="0" cy="0"/>
-          <a:chOff x="0" y="0"/>
-          <a:chExt cx="0" cy="0"/>
-        </a:xfrm>
-      </p:grpSpPr>
       <p:pic>
         <p:nvPicPr>
-          <p:cNvPr id="5" name="Picture 4">
-            <a:extLst>
-              <a:ext uri="{FF2B5EF4-FFF2-40B4-BE49-F238E27FC236}">
-                <a16:creationId xmlns:a16="http://schemas.microsoft.com/office/drawing/2014/main" id="{ACD869C1-D46A-4F66-B0F8-7BE8EECE86A7}"/>
+          <p:cNvPr id="3" name="Picture 2" descr="Graphical user interface&#10;&#10;Description automatically generated">
+            <a:extLst>
+              <a:ext uri="{FF2B5EF4-FFF2-40B4-BE49-F238E27FC236}">
+                <a16:creationId xmlns:a16="http://schemas.microsoft.com/office/drawing/2014/main" id="{671110A7-3AA6-3342-2EFD-BC659E8CA909}"/>
               </a:ext>
             </a:extLst>
           </p:cNvPr>
@@ -5515,635 +5874,71 @@
           <p:nvPr/>
         </p:nvPicPr>
         <p:blipFill>
-          <a:blip r:embed="rId2"/>
+          <a:blip r:embed="rId18">
+            <a:extLst>
+              <a:ext uri="{28A0092B-C50C-407E-A947-70E740481C1C}">
+                <a14:useLocalDpi xmlns:a14="http://schemas.microsoft.com/office/drawing/2010/main" val="0"/>
+              </a:ext>
+            </a:extLst>
+          </a:blip>
           <a:stretch>
             <a:fillRect/>
           </a:stretch>
         </p:blipFill>
         <p:spPr>
           <a:xfrm>
-            <a:off x="3249794" y="0"/>
-            <a:ext cx="5692411" cy="6858000"/>
+            <a:off x="2957147" y="2878476"/>
+            <a:ext cx="1361932" cy="1485744"/>
           </a:xfrm>
           <a:prstGeom prst="rect">
             <a:avLst/>
           </a:prstGeom>
         </p:spPr>
       </p:pic>
-      <p:pic>
-        <p:nvPicPr>
-          <p:cNvPr id="6" name="Picture 5">
-            <a:extLst>
-              <a:ext uri="{FF2B5EF4-FFF2-40B4-BE49-F238E27FC236}">
-                <a16:creationId xmlns:a16="http://schemas.microsoft.com/office/drawing/2014/main" id="{F01894FD-D0F3-4EE0-BDC0-2E603DEA2ADF}"/>
-              </a:ext>
-            </a:extLst>
-          </p:cNvPr>
-          <p:cNvPicPr>
-            <a:picLocks noChangeAspect="1"/>
-          </p:cNvPicPr>
+      <p:sp>
+        <p:nvSpPr>
+          <p:cNvPr id="39" name="TextBox 38">
+            <a:extLst>
+              <a:ext uri="{FF2B5EF4-FFF2-40B4-BE49-F238E27FC236}">
+                <a16:creationId xmlns:a16="http://schemas.microsoft.com/office/drawing/2014/main" id="{CC445EB6-0CEE-8D4A-EB26-4E70CD0D8890}"/>
+              </a:ext>
+            </a:extLst>
+          </p:cNvPr>
+          <p:cNvSpPr txBox="1"/>
           <p:nvPr/>
-        </p:nvPicPr>
-        <p:blipFill rotWithShape="1">
-          <a:blip r:embed="rId3">
-            <a:extLst>
-              <a:ext uri="{BEBA8EAE-BF5A-486C-A8C5-ECC9F3942E4B}">
-                <a14:imgProps xmlns:a14="http://schemas.microsoft.com/office/drawing/2010/main">
-                  <a14:imgLayer r:embed="rId4">
-                    <a14:imgEffect>
-                      <a14:artisticGlass/>
-                    </a14:imgEffect>
-                  </a14:imgLayer>
-                </a14:imgProps>
-              </a:ext>
-            </a:extLst>
-          </a:blip>
-          <a:srcRect l="9284" t="82870" r="19881" b="13796"/>
-          <a:stretch/>
-        </p:blipFill>
+        </p:nvSpPr>
         <p:spPr>
           <a:xfrm>
-            <a:off x="3778251" y="5683250"/>
-            <a:ext cx="4032250" cy="228600"/>
+            <a:off x="2700952" y="2146424"/>
+            <a:ext cx="1753034" cy="707886"/>
           </a:xfrm>
           <a:prstGeom prst="rect">
             <a:avLst/>
           </a:prstGeom>
+          <a:noFill/>
         </p:spPr>
-      </p:pic>
+        <p:txBody>
+          <a:bodyPr wrap="square" rtlCol="0">
+            <a:spAutoFit/>
+          </a:bodyPr>
+          <a:lstStyle/>
+          <a:p>
+            <a:pPr algn="ctr"/>
+            <a:r>
+              <a:rPr lang="en-US" sz="2000" dirty="0">
+                <a:solidFill>
+                  <a:srgbClr val="FF9900"/>
+                </a:solidFill>
+              </a:rPr>
+              <a:t>Data Vault Data Modeling</a:t>
+            </a:r>
+          </a:p>
+        </p:txBody>
+      </p:sp>
     </p:spTree>
     <p:extLst>
       <p:ext uri="{BB962C8B-B14F-4D97-AF65-F5344CB8AC3E}">
-        <p14:creationId xmlns:p14="http://schemas.microsoft.com/office/powerpoint/2010/main" val="3824346644"/>
-      </p:ext>
-    </p:extLst>
-  </p:cSld>
-  <p:clrMapOvr>
-    <a:masterClrMapping/>
-  </p:clrMapOvr>
-</p:sld>
-</file>
-
-<file path=ppt/slides/slide11.xml><?xml version="1.0" encoding="utf-8"?>
-<p:sld xmlns:a="http://schemas.openxmlformats.org/drawingml/2006/main" xmlns:r="http://schemas.openxmlformats.org/officeDocument/2006/relationships" xmlns:p="http://schemas.openxmlformats.org/presentationml/2006/main">
-  <p:cSld>
-    <p:spTree>
-      <p:nvGrpSpPr>
-        <p:cNvPr id="1" name=""/>
-        <p:cNvGrpSpPr/>
-        <p:nvPr/>
-      </p:nvGrpSpPr>
-      <p:grpSpPr>
-        <a:xfrm>
-          <a:off x="0" y="0"/>
-          <a:ext cx="0" cy="0"/>
-          <a:chOff x="0" y="0"/>
-          <a:chExt cx="0" cy="0"/>
-        </a:xfrm>
-      </p:grpSpPr>
-      <p:pic>
-        <p:nvPicPr>
-          <p:cNvPr id="5" name="Picture 4">
-            <a:extLst>
-              <a:ext uri="{FF2B5EF4-FFF2-40B4-BE49-F238E27FC236}">
-                <a16:creationId xmlns:a16="http://schemas.microsoft.com/office/drawing/2014/main" id="{6E3AEEAE-A158-44AA-99E0-083F45A073F5}"/>
-              </a:ext>
-            </a:extLst>
-          </p:cNvPr>
-          <p:cNvPicPr>
-            <a:picLocks noChangeAspect="1"/>
-          </p:cNvPicPr>
-          <p:nvPr/>
-        </p:nvPicPr>
-        <p:blipFill>
-          <a:blip r:embed="rId2"/>
-          <a:stretch>
-            <a:fillRect/>
-          </a:stretch>
-        </p:blipFill>
-        <p:spPr>
-          <a:xfrm>
-            <a:off x="4043347" y="1133458"/>
-            <a:ext cx="4105305" cy="4591084"/>
-          </a:xfrm>
-          <a:prstGeom prst="rect">
-            <a:avLst/>
-          </a:prstGeom>
-        </p:spPr>
-      </p:pic>
-    </p:spTree>
-    <p:extLst>
-      <p:ext uri="{BB962C8B-B14F-4D97-AF65-F5344CB8AC3E}">
-        <p14:creationId xmlns:p14="http://schemas.microsoft.com/office/powerpoint/2010/main" val="1205139507"/>
-      </p:ext>
-    </p:extLst>
-  </p:cSld>
-  <p:clrMapOvr>
-    <a:masterClrMapping/>
-  </p:clrMapOvr>
-</p:sld>
-</file>
-
-<file path=ppt/slides/slide12.xml><?xml version="1.0" encoding="utf-8"?>
-<p:sld xmlns:a="http://schemas.openxmlformats.org/drawingml/2006/main" xmlns:r="http://schemas.openxmlformats.org/officeDocument/2006/relationships" xmlns:p="http://schemas.openxmlformats.org/presentationml/2006/main">
-  <p:cSld>
-    <p:spTree>
-      <p:nvGrpSpPr>
-        <p:cNvPr id="1" name=""/>
-        <p:cNvGrpSpPr/>
-        <p:nvPr/>
-      </p:nvGrpSpPr>
-      <p:grpSpPr>
-        <a:xfrm>
-          <a:off x="0" y="0"/>
-          <a:ext cx="0" cy="0"/>
-          <a:chOff x="0" y="0"/>
-          <a:chExt cx="0" cy="0"/>
-        </a:xfrm>
-      </p:grpSpPr>
-      <p:grpSp>
-        <p:nvGrpSpPr>
-          <p:cNvPr id="2" name="Group 1">
-            <a:extLst>
-              <a:ext uri="{FF2B5EF4-FFF2-40B4-BE49-F238E27FC236}">
-                <a16:creationId xmlns:a16="http://schemas.microsoft.com/office/drawing/2014/main" id="{63D100F7-5634-4E30-8F2C-67F0907C7907}"/>
-              </a:ext>
-            </a:extLst>
-          </p:cNvPr>
-          <p:cNvGrpSpPr/>
-          <p:nvPr/>
-        </p:nvGrpSpPr>
-        <p:grpSpPr>
-          <a:xfrm>
-            <a:off x="830395" y="71181"/>
-            <a:ext cx="10274246" cy="6553864"/>
-            <a:chOff x="830395" y="71181"/>
-            <a:chExt cx="10274246" cy="6553864"/>
-          </a:xfrm>
-        </p:grpSpPr>
-        <p:pic>
-          <p:nvPicPr>
-            <p:cNvPr id="6" name="Picture 5">
-              <a:extLst>
-                <a:ext uri="{FF2B5EF4-FFF2-40B4-BE49-F238E27FC236}">
-                  <a16:creationId xmlns:a16="http://schemas.microsoft.com/office/drawing/2014/main" id="{168FF33C-EE55-404D-B202-C2CCD6FF0752}"/>
-                </a:ext>
-              </a:extLst>
-            </p:cNvPr>
-            <p:cNvPicPr>
-              <a:picLocks noChangeAspect="1"/>
-            </p:cNvPicPr>
-            <p:nvPr/>
-          </p:nvPicPr>
-          <p:blipFill>
-            <a:blip r:embed="rId2"/>
-            <a:stretch>
-              <a:fillRect/>
-            </a:stretch>
-          </p:blipFill>
-          <p:spPr>
-            <a:xfrm>
-              <a:off x="830395" y="1095528"/>
-              <a:ext cx="10274246" cy="5529517"/>
-            </a:xfrm>
-            <a:prstGeom prst="rect">
-              <a:avLst/>
-            </a:prstGeom>
-          </p:spPr>
-        </p:pic>
-        <p:sp>
-          <p:nvSpPr>
-            <p:cNvPr id="15" name="TextBox 14">
-              <a:extLst>
-                <a:ext uri="{FF2B5EF4-FFF2-40B4-BE49-F238E27FC236}">
-                  <a16:creationId xmlns:a16="http://schemas.microsoft.com/office/drawing/2014/main" id="{ACF257E7-7E2B-4BA1-A4AE-B5C545042387}"/>
-                </a:ext>
-              </a:extLst>
-            </p:cNvPr>
-            <p:cNvSpPr txBox="1"/>
-            <p:nvPr/>
-          </p:nvSpPr>
-          <p:spPr>
-            <a:xfrm>
-              <a:off x="1122428" y="71181"/>
-              <a:ext cx="9690180" cy="1024347"/>
-            </a:xfrm>
-            <a:prstGeom prst="rect">
-              <a:avLst/>
-            </a:prstGeom>
-            <a:noFill/>
-          </p:spPr>
-          <p:txBody>
-            <a:bodyPr wrap="square">
-              <a:spAutoFit/>
-            </a:bodyPr>
-            <a:lstStyle/>
-            <a:p>
-              <a:r>
-                <a:rPr lang="en-US" sz="2400" dirty="0" err="1">
-                  <a:solidFill>
-                    <a:schemeClr val="accent1"/>
-                  </a:solidFill>
-                </a:rPr>
-                <a:t>BigQuery</a:t>
-              </a:r>
-              <a:r>
-                <a:rPr lang="en-US" sz="2400" dirty="0">
-                  <a:solidFill>
-                    <a:schemeClr val="accent1"/>
-                  </a:solidFill>
-                </a:rPr>
-                <a:t>:</a:t>
-              </a:r>
-            </a:p>
-            <a:p>
-              <a:r>
-                <a:rPr lang="en-US" sz="1800" dirty="0">
-                  <a:solidFill>
-                    <a:schemeClr val="accent1"/>
-                  </a:solidFill>
-                </a:rPr>
-                <a:t>Go to the [DATASET.TABLE_NAME] you chose in the cloud_function_event_prod.py. Go </a:t>
-              </a:r>
-              <a:r>
-                <a:rPr lang="en-US" dirty="0">
-                  <a:solidFill>
-                    <a:schemeClr val="accent1"/>
-                  </a:solidFill>
-                </a:rPr>
-                <a:t>to </a:t>
-              </a:r>
-              <a:r>
-                <a:rPr lang="en-US" dirty="0" err="1">
-                  <a:solidFill>
-                    <a:schemeClr val="accent1"/>
-                  </a:solidFill>
-                </a:rPr>
-                <a:t>BigQuery</a:t>
-              </a:r>
-              <a:r>
-                <a:rPr lang="en-US" dirty="0">
-                  <a:solidFill>
-                    <a:schemeClr val="accent1"/>
-                  </a:solidFill>
-                </a:rPr>
-                <a:t> and q</a:t>
-              </a:r>
-              <a:r>
-                <a:rPr lang="en-US" sz="1800" dirty="0">
-                  <a:solidFill>
-                    <a:schemeClr val="accent1"/>
-                  </a:solidFill>
-                </a:rPr>
-                <a:t>uery the table after publishing using the main.py script.</a:t>
-              </a:r>
-            </a:p>
-          </p:txBody>
-        </p:sp>
-        <p:sp>
-          <p:nvSpPr>
-            <p:cNvPr id="22" name="Rectangle 21">
-              <a:extLst>
-                <a:ext uri="{FF2B5EF4-FFF2-40B4-BE49-F238E27FC236}">
-                  <a16:creationId xmlns:a16="http://schemas.microsoft.com/office/drawing/2014/main" id="{C0AB7178-3BA5-453B-9E20-EE7B700B6114}"/>
-                </a:ext>
-              </a:extLst>
-            </p:cNvPr>
-            <p:cNvSpPr/>
-            <p:nvPr/>
-          </p:nvSpPr>
-          <p:spPr>
-            <a:xfrm>
-              <a:off x="2724794" y="3057412"/>
-              <a:ext cx="1576307" cy="1500647"/>
-            </a:xfrm>
-            <a:prstGeom prst="rect">
-              <a:avLst/>
-            </a:prstGeom>
-            <a:noFill/>
-            <a:ln w="38100">
-              <a:solidFill>
-                <a:srgbClr val="C00000"/>
-              </a:solidFill>
-            </a:ln>
-          </p:spPr>
-          <p:style>
-            <a:lnRef idx="2">
-              <a:schemeClr val="accent1">
-                <a:shade val="50000"/>
-              </a:schemeClr>
-            </a:lnRef>
-            <a:fillRef idx="1">
-              <a:schemeClr val="accent1"/>
-            </a:fillRef>
-            <a:effectRef idx="0">
-              <a:schemeClr val="accent1"/>
-            </a:effectRef>
-            <a:fontRef idx="minor">
-              <a:schemeClr val="lt1"/>
-            </a:fontRef>
-          </p:style>
-          <p:txBody>
-            <a:bodyPr rtlCol="0" anchor="ctr"/>
-            <a:lstStyle/>
-            <a:p>
-              <a:pPr algn="ctr"/>
-              <a:endParaRPr lang="en-US"/>
-            </a:p>
-          </p:txBody>
-        </p:sp>
-        <p:sp>
-          <p:nvSpPr>
-            <p:cNvPr id="24" name="Rectangle 23">
-              <a:extLst>
-                <a:ext uri="{FF2B5EF4-FFF2-40B4-BE49-F238E27FC236}">
-                  <a16:creationId xmlns:a16="http://schemas.microsoft.com/office/drawing/2014/main" id="{C665467D-1D2E-4809-9955-85B6F5FC4BA5}"/>
-                </a:ext>
-              </a:extLst>
-            </p:cNvPr>
-            <p:cNvSpPr/>
-            <p:nvPr/>
-          </p:nvSpPr>
-          <p:spPr>
-            <a:xfrm>
-              <a:off x="5103004" y="2250936"/>
-              <a:ext cx="5393019" cy="170808"/>
-            </a:xfrm>
-            <a:prstGeom prst="rect">
-              <a:avLst/>
-            </a:prstGeom>
-            <a:noFill/>
-            <a:ln w="38100">
-              <a:solidFill>
-                <a:srgbClr val="C00000"/>
-              </a:solidFill>
-            </a:ln>
-          </p:spPr>
-          <p:style>
-            <a:lnRef idx="2">
-              <a:schemeClr val="accent1">
-                <a:shade val="50000"/>
-              </a:schemeClr>
-            </a:lnRef>
-            <a:fillRef idx="1">
-              <a:schemeClr val="accent1"/>
-            </a:fillRef>
-            <a:effectRef idx="0">
-              <a:schemeClr val="accent1"/>
-            </a:effectRef>
-            <a:fontRef idx="minor">
-              <a:schemeClr val="lt1"/>
-            </a:fontRef>
-          </p:style>
-          <p:txBody>
-            <a:bodyPr rtlCol="0" anchor="ctr"/>
-            <a:lstStyle/>
-            <a:p>
-              <a:pPr algn="ctr"/>
-              <a:endParaRPr lang="en-US"/>
-            </a:p>
-          </p:txBody>
-        </p:sp>
-        <p:sp>
-          <p:nvSpPr>
-            <p:cNvPr id="26" name="Rectangle 25">
-              <a:extLst>
-                <a:ext uri="{FF2B5EF4-FFF2-40B4-BE49-F238E27FC236}">
-                  <a16:creationId xmlns:a16="http://schemas.microsoft.com/office/drawing/2014/main" id="{23E989DB-F35A-4791-B762-49C59DDEAA86}"/>
-                </a:ext>
-              </a:extLst>
-            </p:cNvPr>
-            <p:cNvSpPr/>
-            <p:nvPr/>
-          </p:nvSpPr>
-          <p:spPr>
-            <a:xfrm>
-              <a:off x="4788416" y="3311027"/>
-              <a:ext cx="6316225" cy="2884192"/>
-            </a:xfrm>
-            <a:prstGeom prst="rect">
-              <a:avLst/>
-            </a:prstGeom>
-            <a:noFill/>
-            <a:ln w="38100">
-              <a:solidFill>
-                <a:srgbClr val="C00000"/>
-              </a:solidFill>
-            </a:ln>
-          </p:spPr>
-          <p:style>
-            <a:lnRef idx="2">
-              <a:schemeClr val="accent1">
-                <a:shade val="50000"/>
-              </a:schemeClr>
-            </a:lnRef>
-            <a:fillRef idx="1">
-              <a:schemeClr val="accent1"/>
-            </a:fillRef>
-            <a:effectRef idx="0">
-              <a:schemeClr val="accent1"/>
-            </a:effectRef>
-            <a:fontRef idx="minor">
-              <a:schemeClr val="lt1"/>
-            </a:fontRef>
-          </p:style>
-          <p:txBody>
-            <a:bodyPr rtlCol="0" anchor="ctr"/>
-            <a:lstStyle/>
-            <a:p>
-              <a:pPr algn="ctr"/>
-              <a:endParaRPr lang="en-US"/>
-            </a:p>
-          </p:txBody>
-        </p:sp>
-        <p:pic>
-          <p:nvPicPr>
-            <p:cNvPr id="7" name="Picture 6">
-              <a:extLst>
-                <a:ext uri="{FF2B5EF4-FFF2-40B4-BE49-F238E27FC236}">
-                  <a16:creationId xmlns:a16="http://schemas.microsoft.com/office/drawing/2014/main" id="{D73E1B9A-1471-4FD9-8649-C857A93BD9FF}"/>
-                </a:ext>
-              </a:extLst>
-            </p:cNvPr>
-            <p:cNvPicPr>
-              <a:picLocks noChangeAspect="1"/>
-            </p:cNvPicPr>
-            <p:nvPr/>
-          </p:nvPicPr>
-          <p:blipFill rotWithShape="1">
-            <a:blip r:embed="rId3">
-              <a:extLst>
-                <a:ext uri="{BEBA8EAE-BF5A-486C-A8C5-ECC9F3942E4B}">
-                  <a14:imgProps xmlns:a14="http://schemas.microsoft.com/office/drawing/2010/main">
-                    <a14:imgLayer r:embed="rId4">
-                      <a14:imgEffect>
-                        <a14:artisticGlass/>
-                      </a14:imgEffect>
-                    </a14:imgLayer>
-                  </a14:imgProps>
-                </a:ext>
-              </a:extLst>
-            </a:blip>
-            <a:srcRect l="9284" t="82870" r="19881" b="13796"/>
-            <a:stretch/>
-          </p:blipFill>
-          <p:spPr>
-            <a:xfrm>
-              <a:off x="3086879" y="3137740"/>
-              <a:ext cx="1126615" cy="173286"/>
-            </a:xfrm>
-            <a:prstGeom prst="rect">
-              <a:avLst/>
-            </a:prstGeom>
-          </p:spPr>
-        </p:pic>
-        <p:pic>
-          <p:nvPicPr>
-            <p:cNvPr id="8" name="Picture 7">
-              <a:extLst>
-                <a:ext uri="{FF2B5EF4-FFF2-40B4-BE49-F238E27FC236}">
-                  <a16:creationId xmlns:a16="http://schemas.microsoft.com/office/drawing/2014/main" id="{D9CF81B8-3784-417E-9AF6-7F6088BFDFE3}"/>
-                </a:ext>
-              </a:extLst>
-            </p:cNvPr>
-            <p:cNvPicPr>
-              <a:picLocks noChangeAspect="1"/>
-            </p:cNvPicPr>
-            <p:nvPr/>
-          </p:nvPicPr>
-          <p:blipFill rotWithShape="1">
-            <a:blip r:embed="rId3">
-              <a:extLst>
-                <a:ext uri="{BEBA8EAE-BF5A-486C-A8C5-ECC9F3942E4B}">
-                  <a14:imgProps xmlns:a14="http://schemas.microsoft.com/office/drawing/2010/main">
-                    <a14:imgLayer r:embed="rId4">
-                      <a14:imgEffect>
-                        <a14:artisticGlass/>
-                      </a14:imgEffect>
-                    </a14:imgLayer>
-                  </a14:imgProps>
-                </a:ext>
-              </a:extLst>
-            </a:blip>
-            <a:srcRect l="9284" t="82870" r="19881" b="13796"/>
-            <a:stretch/>
-          </p:blipFill>
-          <p:spPr>
-            <a:xfrm>
-              <a:off x="5967518" y="2283903"/>
-              <a:ext cx="3086273" cy="103431"/>
-            </a:xfrm>
-            <a:prstGeom prst="rect">
-              <a:avLst/>
-            </a:prstGeom>
-          </p:spPr>
-        </p:pic>
-        <p:pic>
-          <p:nvPicPr>
-            <p:cNvPr id="9" name="Picture 8">
-              <a:extLst>
-                <a:ext uri="{FF2B5EF4-FFF2-40B4-BE49-F238E27FC236}">
-                  <a16:creationId xmlns:a16="http://schemas.microsoft.com/office/drawing/2014/main" id="{F8B0C59F-EA8D-484A-99DB-CB084904867E}"/>
-                </a:ext>
-              </a:extLst>
-            </p:cNvPr>
-            <p:cNvPicPr>
-              <a:picLocks noChangeAspect="1"/>
-            </p:cNvPicPr>
-            <p:nvPr/>
-          </p:nvPicPr>
-          <p:blipFill rotWithShape="1">
-            <a:blip r:embed="rId3">
-              <a:extLst>
-                <a:ext uri="{BEBA8EAE-BF5A-486C-A8C5-ECC9F3942E4B}">
-                  <a14:imgProps xmlns:a14="http://schemas.microsoft.com/office/drawing/2010/main">
-                    <a14:imgLayer r:embed="rId4">
-                      <a14:imgEffect>
-                        <a14:artisticGlass/>
-                      </a14:imgEffect>
-                    </a14:imgLayer>
-                  </a14:imgProps>
-                </a:ext>
-              </a:extLst>
-            </a:blip>
-            <a:srcRect l="9284" t="82870" r="19881" b="13796"/>
-            <a:stretch/>
-          </p:blipFill>
-          <p:spPr>
-            <a:xfrm>
-              <a:off x="2724794" y="1178171"/>
-              <a:ext cx="1126615" cy="173286"/>
-            </a:xfrm>
-            <a:prstGeom prst="rect">
-              <a:avLst/>
-            </a:prstGeom>
-          </p:spPr>
-        </p:pic>
-      </p:grpSp>
-    </p:spTree>
-    <p:extLst>
-      <p:ext uri="{BB962C8B-B14F-4D97-AF65-F5344CB8AC3E}">
-        <p14:creationId xmlns:p14="http://schemas.microsoft.com/office/powerpoint/2010/main" val="3995841754"/>
-      </p:ext>
-    </p:extLst>
-  </p:cSld>
-  <p:clrMapOvr>
-    <a:masterClrMapping/>
-  </p:clrMapOvr>
-</p:sld>
-</file>
-
-<file path=ppt/slides/slide13.xml><?xml version="1.0" encoding="utf-8"?>
-<p:sld xmlns:a="http://schemas.openxmlformats.org/drawingml/2006/main" xmlns:r="http://schemas.openxmlformats.org/officeDocument/2006/relationships" xmlns:p="http://schemas.openxmlformats.org/presentationml/2006/main">
-  <p:cSld>
-    <p:spTree>
-      <p:nvGrpSpPr>
-        <p:cNvPr id="1" name=""/>
-        <p:cNvGrpSpPr/>
-        <p:nvPr/>
-      </p:nvGrpSpPr>
-      <p:grpSpPr>
-        <a:xfrm>
-          <a:off x="0" y="0"/>
-          <a:ext cx="0" cy="0"/>
-          <a:chOff x="0" y="0"/>
-          <a:chExt cx="0" cy="0"/>
-        </a:xfrm>
-      </p:grpSpPr>
-      <p:pic>
-        <p:nvPicPr>
-          <p:cNvPr id="7" name="Picture 6">
-            <a:extLst>
-              <a:ext uri="{FF2B5EF4-FFF2-40B4-BE49-F238E27FC236}">
-                <a16:creationId xmlns:a16="http://schemas.microsoft.com/office/drawing/2014/main" id="{A8AC5FA5-8930-43E2-86E6-FF4CEC75DE67}"/>
-              </a:ext>
-            </a:extLst>
-          </p:cNvPr>
-          <p:cNvPicPr>
-            <a:picLocks noChangeAspect="1"/>
-          </p:cNvPicPr>
-          <p:nvPr/>
-        </p:nvPicPr>
-        <p:blipFill>
-          <a:blip r:embed="rId2"/>
-          <a:stretch>
-            <a:fillRect/>
-          </a:stretch>
-        </p:blipFill>
-        <p:spPr>
-          <a:xfrm>
-            <a:off x="2971777" y="2076440"/>
-            <a:ext cx="6248446" cy="2705120"/>
-          </a:xfrm>
-          <a:prstGeom prst="rect">
-            <a:avLst/>
-          </a:prstGeom>
-        </p:spPr>
-      </p:pic>
-    </p:spTree>
-    <p:extLst>
-      <p:ext uri="{BB962C8B-B14F-4D97-AF65-F5344CB8AC3E}">
-        <p14:creationId xmlns:p14="http://schemas.microsoft.com/office/powerpoint/2010/main" val="849574699"/>
+        <p14:creationId xmlns:p14="http://schemas.microsoft.com/office/powerpoint/2010/main" val="2637552424"/>
       </p:ext>
     </p:extLst>
   </p:cSld>
@@ -6175,7 +5970,7 @@
           <p:cNvPr id="3" name="Picture 2">
             <a:extLst>
               <a:ext uri="{FF2B5EF4-FFF2-40B4-BE49-F238E27FC236}">
-                <a16:creationId xmlns:a16="http://schemas.microsoft.com/office/drawing/2014/main" id="{00E47EC6-E36E-4149-96BC-1CF4177E953F}"/>
+                <a16:creationId xmlns:a16="http://schemas.microsoft.com/office/drawing/2014/main" id="{A06B3056-A351-5E3C-1100-7273ABB4EDB3}"/>
               </a:ext>
             </a:extLst>
           </p:cNvPr>
@@ -6192,8 +5987,8 @@
         </p:blipFill>
         <p:spPr>
           <a:xfrm>
-            <a:off x="3424218" y="962007"/>
-            <a:ext cx="5343564" cy="4933986"/>
+            <a:off x="3057503" y="1352535"/>
+            <a:ext cx="6076994" cy="4152930"/>
           </a:xfrm>
           <a:prstGeom prst="rect">
             <a:avLst/>
@@ -6203,7 +5998,7 @@
     </p:spTree>
     <p:extLst>
       <p:ext uri="{BB962C8B-B14F-4D97-AF65-F5344CB8AC3E}">
-        <p14:creationId xmlns:p14="http://schemas.microsoft.com/office/powerpoint/2010/main" val="3500024006"/>
+        <p14:creationId xmlns:p14="http://schemas.microsoft.com/office/powerpoint/2010/main" val="849574699"/>
       </p:ext>
     </p:extLst>
   </p:cSld>
@@ -6230,90 +6025,40 @@
           <a:chExt cx="0" cy="0"/>
         </a:xfrm>
       </p:grpSpPr>
-      <p:grpSp>
-        <p:nvGrpSpPr>
-          <p:cNvPr id="8" name="Group 7">
-            <a:extLst>
-              <a:ext uri="{FF2B5EF4-FFF2-40B4-BE49-F238E27FC236}">
-                <a16:creationId xmlns:a16="http://schemas.microsoft.com/office/drawing/2014/main" id="{BCA14098-6DC4-4792-86BE-DF490E811A54}"/>
-              </a:ext>
-            </a:extLst>
-          </p:cNvPr>
-          <p:cNvGrpSpPr/>
+      <p:pic>
+        <p:nvPicPr>
+          <p:cNvPr id="4" name="Picture 3">
+            <a:extLst>
+              <a:ext uri="{FF2B5EF4-FFF2-40B4-BE49-F238E27FC236}">
+                <a16:creationId xmlns:a16="http://schemas.microsoft.com/office/drawing/2014/main" id="{35E729E3-65F0-D47A-B267-E1ECAB397BC3}"/>
+              </a:ext>
+            </a:extLst>
+          </p:cNvPr>
+          <p:cNvPicPr>
+            <a:picLocks noChangeAspect="1"/>
+          </p:cNvPicPr>
           <p:nvPr/>
-        </p:nvGrpSpPr>
-        <p:grpSpPr>
+        </p:nvPicPr>
+        <p:blipFill>
+          <a:blip r:embed="rId2"/>
+          <a:stretch>
+            <a:fillRect/>
+          </a:stretch>
+        </p:blipFill>
+        <p:spPr>
           <a:xfrm>
-            <a:off x="3539591" y="-406400"/>
-            <a:ext cx="4998517" cy="10023487"/>
-            <a:chOff x="3596742" y="0"/>
-            <a:chExt cx="4998517" cy="10023487"/>
+            <a:off x="314325" y="1981200"/>
+            <a:ext cx="11563350" cy="2895600"/>
           </a:xfrm>
-        </p:grpSpPr>
-        <p:pic>
-          <p:nvPicPr>
-            <p:cNvPr id="5" name="Picture 4">
-              <a:extLst>
-                <a:ext uri="{FF2B5EF4-FFF2-40B4-BE49-F238E27FC236}">
-                  <a16:creationId xmlns:a16="http://schemas.microsoft.com/office/drawing/2014/main" id="{BB703734-B43D-462A-8468-69CD4D83CA7F}"/>
-                </a:ext>
-              </a:extLst>
-            </p:cNvPr>
-            <p:cNvPicPr>
-              <a:picLocks noChangeAspect="1"/>
-            </p:cNvPicPr>
-            <p:nvPr/>
-          </p:nvPicPr>
-          <p:blipFill>
-            <a:blip r:embed="rId2"/>
-            <a:stretch>
-              <a:fillRect/>
-            </a:stretch>
-          </p:blipFill>
-          <p:spPr>
-            <a:xfrm>
-              <a:off x="3596742" y="0"/>
-              <a:ext cx="4998516" cy="6858000"/>
-            </a:xfrm>
-            <a:prstGeom prst="rect">
-              <a:avLst/>
-            </a:prstGeom>
-          </p:spPr>
-        </p:pic>
-        <p:pic>
-          <p:nvPicPr>
-            <p:cNvPr id="7" name="Picture 6">
-              <a:extLst>
-                <a:ext uri="{FF2B5EF4-FFF2-40B4-BE49-F238E27FC236}">
-                  <a16:creationId xmlns:a16="http://schemas.microsoft.com/office/drawing/2014/main" id="{56AAEC8C-D5C3-44CC-98D4-BD9A2C007051}"/>
-                </a:ext>
-              </a:extLst>
-            </p:cNvPr>
-            <p:cNvPicPr>
-              <a:picLocks noChangeAspect="1"/>
-            </p:cNvPicPr>
-            <p:nvPr/>
-          </p:nvPicPr>
-          <p:blipFill rotWithShape="1">
-            <a:blip r:embed="rId3"/>
-            <a:srcRect r="7888"/>
-            <a:stretch/>
-          </p:blipFill>
-          <p:spPr>
-            <a:xfrm>
-              <a:off x="3596743" y="6804013"/>
-              <a:ext cx="4998516" cy="3219474"/>
-            </a:xfrm>
-            <a:prstGeom prst="rect">
-              <a:avLst/>
-            </a:prstGeom>
-          </p:spPr>
-        </p:pic>
-      </p:grpSp>
+          <a:prstGeom prst="rect">
+            <a:avLst/>
+          </a:prstGeom>
+        </p:spPr>
+      </p:pic>
     </p:spTree>
     <p:extLst>
       <p:ext uri="{BB962C8B-B14F-4D97-AF65-F5344CB8AC3E}">
-        <p14:creationId xmlns:p14="http://schemas.microsoft.com/office/powerpoint/2010/main" val="3204689719"/>
+        <p14:creationId xmlns:p14="http://schemas.microsoft.com/office/powerpoint/2010/main" val="1501980821"/>
       </p:ext>
     </p:extLst>
   </p:cSld>
@@ -6342,10 +6087,10 @@
       </p:grpSpPr>
       <p:pic>
         <p:nvPicPr>
-          <p:cNvPr id="6" name="Picture 5">
-            <a:extLst>
-              <a:ext uri="{FF2B5EF4-FFF2-40B4-BE49-F238E27FC236}">
-                <a16:creationId xmlns:a16="http://schemas.microsoft.com/office/drawing/2014/main" id="{C2186FB6-FB9F-41D9-9CE3-EEF3890ED259}"/>
+          <p:cNvPr id="8" name="Picture 7">
+            <a:extLst>
+              <a:ext uri="{FF2B5EF4-FFF2-40B4-BE49-F238E27FC236}">
+                <a16:creationId xmlns:a16="http://schemas.microsoft.com/office/drawing/2014/main" id="{95455ED1-8A22-E4D4-3DB2-DC59088B72C2}"/>
               </a:ext>
             </a:extLst>
           </p:cNvPr>
@@ -6362,18 +6107,226 @@
         </p:blipFill>
         <p:spPr>
           <a:xfrm>
-            <a:off x="3457555" y="847706"/>
-            <a:ext cx="5276889" cy="5162588"/>
+            <a:off x="1190625" y="695325"/>
+            <a:ext cx="9810750" cy="5467350"/>
           </a:xfrm>
           <a:prstGeom prst="rect">
             <a:avLst/>
           </a:prstGeom>
         </p:spPr>
       </p:pic>
+      <p:sp>
+        <p:nvSpPr>
+          <p:cNvPr id="9" name="Rectangle 8">
+            <a:extLst>
+              <a:ext uri="{FF2B5EF4-FFF2-40B4-BE49-F238E27FC236}">
+                <a16:creationId xmlns:a16="http://schemas.microsoft.com/office/drawing/2014/main" id="{A8AFBAB6-A0A4-29D3-CD41-B1F7DA271134}"/>
+              </a:ext>
+            </a:extLst>
+          </p:cNvPr>
+          <p:cNvSpPr/>
+          <p:nvPr/>
+        </p:nvSpPr>
+        <p:spPr>
+          <a:xfrm>
+            <a:off x="1320800" y="1016000"/>
+            <a:ext cx="863600" cy="266700"/>
+          </a:xfrm>
+          <a:prstGeom prst="rect">
+            <a:avLst/>
+          </a:prstGeom>
+          <a:noFill/>
+          <a:ln w="57150">
+            <a:solidFill>
+              <a:srgbClr val="C00000"/>
+            </a:solidFill>
+          </a:ln>
+        </p:spPr>
+        <p:style>
+          <a:lnRef idx="2">
+            <a:schemeClr val="accent1">
+              <a:shade val="50000"/>
+            </a:schemeClr>
+          </a:lnRef>
+          <a:fillRef idx="1">
+            <a:schemeClr val="accent1"/>
+          </a:fillRef>
+          <a:effectRef idx="0">
+            <a:schemeClr val="accent1"/>
+          </a:effectRef>
+          <a:fontRef idx="minor">
+            <a:schemeClr val="lt1"/>
+          </a:fontRef>
+        </p:style>
+        <p:txBody>
+          <a:bodyPr rtlCol="0" anchor="ctr"/>
+          <a:lstStyle/>
+          <a:p>
+            <a:pPr algn="ctr"/>
+            <a:endParaRPr lang="en-US"/>
+          </a:p>
+        </p:txBody>
+      </p:sp>
+      <p:sp>
+        <p:nvSpPr>
+          <p:cNvPr id="12" name="Rectangle 11">
+            <a:extLst>
+              <a:ext uri="{FF2B5EF4-FFF2-40B4-BE49-F238E27FC236}">
+                <a16:creationId xmlns:a16="http://schemas.microsoft.com/office/drawing/2014/main" id="{55647193-1FED-3C1C-E877-A2D65728646D}"/>
+              </a:ext>
+            </a:extLst>
+          </p:cNvPr>
+          <p:cNvSpPr/>
+          <p:nvPr/>
+        </p:nvSpPr>
+        <p:spPr>
+          <a:xfrm>
+            <a:off x="1266825" y="3022600"/>
+            <a:ext cx="561975" cy="406400"/>
+          </a:xfrm>
+          <a:prstGeom prst="rect">
+            <a:avLst/>
+          </a:prstGeom>
+          <a:noFill/>
+          <a:ln w="57150">
+            <a:solidFill>
+              <a:srgbClr val="C00000"/>
+            </a:solidFill>
+          </a:ln>
+        </p:spPr>
+        <p:style>
+          <a:lnRef idx="2">
+            <a:schemeClr val="accent1">
+              <a:shade val="50000"/>
+            </a:schemeClr>
+          </a:lnRef>
+          <a:fillRef idx="1">
+            <a:schemeClr val="accent1"/>
+          </a:fillRef>
+          <a:effectRef idx="0">
+            <a:schemeClr val="accent1"/>
+          </a:effectRef>
+          <a:fontRef idx="minor">
+            <a:schemeClr val="lt1"/>
+          </a:fontRef>
+        </p:style>
+        <p:txBody>
+          <a:bodyPr rtlCol="0" anchor="ctr"/>
+          <a:lstStyle/>
+          <a:p>
+            <a:pPr algn="ctr"/>
+            <a:endParaRPr lang="en-US"/>
+          </a:p>
+        </p:txBody>
+      </p:sp>
+      <p:sp>
+        <p:nvSpPr>
+          <p:cNvPr id="13" name="Rectangle 12">
+            <a:extLst>
+              <a:ext uri="{FF2B5EF4-FFF2-40B4-BE49-F238E27FC236}">
+                <a16:creationId xmlns:a16="http://schemas.microsoft.com/office/drawing/2014/main" id="{C0817E1B-A8E4-69A4-0504-6E8B05F6CF7E}"/>
+              </a:ext>
+            </a:extLst>
+          </p:cNvPr>
+          <p:cNvSpPr/>
+          <p:nvPr/>
+        </p:nvSpPr>
+        <p:spPr>
+          <a:xfrm>
+            <a:off x="4137025" y="3695700"/>
+            <a:ext cx="993775" cy="304800"/>
+          </a:xfrm>
+          <a:prstGeom prst="rect">
+            <a:avLst/>
+          </a:prstGeom>
+          <a:noFill/>
+          <a:ln w="57150">
+            <a:solidFill>
+              <a:srgbClr val="C00000"/>
+            </a:solidFill>
+          </a:ln>
+        </p:spPr>
+        <p:style>
+          <a:lnRef idx="2">
+            <a:schemeClr val="accent1">
+              <a:shade val="50000"/>
+            </a:schemeClr>
+          </a:lnRef>
+          <a:fillRef idx="1">
+            <a:schemeClr val="accent1"/>
+          </a:fillRef>
+          <a:effectRef idx="0">
+            <a:schemeClr val="accent1"/>
+          </a:effectRef>
+          <a:fontRef idx="minor">
+            <a:schemeClr val="lt1"/>
+          </a:fontRef>
+        </p:style>
+        <p:txBody>
+          <a:bodyPr rtlCol="0" anchor="ctr"/>
+          <a:lstStyle/>
+          <a:p>
+            <a:pPr algn="ctr"/>
+            <a:endParaRPr lang="en-US"/>
+          </a:p>
+        </p:txBody>
+      </p:sp>
+      <p:sp>
+        <p:nvSpPr>
+          <p:cNvPr id="14" name="Rectangle 13">
+            <a:extLst>
+              <a:ext uri="{FF2B5EF4-FFF2-40B4-BE49-F238E27FC236}">
+                <a16:creationId xmlns:a16="http://schemas.microsoft.com/office/drawing/2014/main" id="{88B6E0A7-6914-FD27-B0E2-9599EA29BAB4}"/>
+              </a:ext>
+            </a:extLst>
+          </p:cNvPr>
+          <p:cNvSpPr/>
+          <p:nvPr/>
+        </p:nvSpPr>
+        <p:spPr>
+          <a:xfrm>
+            <a:off x="3143250" y="4000500"/>
+            <a:ext cx="4845050" cy="215900"/>
+          </a:xfrm>
+          <a:prstGeom prst="rect">
+            <a:avLst/>
+          </a:prstGeom>
+          <a:noFill/>
+          <a:ln w="57150">
+            <a:solidFill>
+              <a:srgbClr val="C00000"/>
+            </a:solidFill>
+          </a:ln>
+        </p:spPr>
+        <p:style>
+          <a:lnRef idx="2">
+            <a:schemeClr val="accent1">
+              <a:shade val="50000"/>
+            </a:schemeClr>
+          </a:lnRef>
+          <a:fillRef idx="1">
+            <a:schemeClr val="accent1"/>
+          </a:fillRef>
+          <a:effectRef idx="0">
+            <a:schemeClr val="accent1"/>
+          </a:effectRef>
+          <a:fontRef idx="minor">
+            <a:schemeClr val="lt1"/>
+          </a:fontRef>
+        </p:style>
+        <p:txBody>
+          <a:bodyPr rtlCol="0" anchor="ctr"/>
+          <a:lstStyle/>
+          <a:p>
+            <a:pPr algn="ctr"/>
+            <a:endParaRPr lang="en-US"/>
+          </a:p>
+        </p:txBody>
+      </p:sp>
     </p:spTree>
     <p:extLst>
       <p:ext uri="{BB962C8B-B14F-4D97-AF65-F5344CB8AC3E}">
-        <p14:creationId xmlns:p14="http://schemas.microsoft.com/office/powerpoint/2010/main" val="2533316695"/>
+        <p14:creationId xmlns:p14="http://schemas.microsoft.com/office/powerpoint/2010/main" val="399489823"/>
       </p:ext>
     </p:extLst>
   </p:cSld>
@@ -6400,484 +6353,10 @@
           <a:chExt cx="0" cy="0"/>
         </a:xfrm>
       </p:grpSpPr>
-      <p:pic>
-        <p:nvPicPr>
-          <p:cNvPr id="4" name="Picture 3">
-            <a:extLst>
-              <a:ext uri="{FF2B5EF4-FFF2-40B4-BE49-F238E27FC236}">
-                <a16:creationId xmlns:a16="http://schemas.microsoft.com/office/drawing/2014/main" id="{A67574FD-E161-4DCD-A07A-B3CA690DB364}"/>
-              </a:ext>
-            </a:extLst>
-          </p:cNvPr>
-          <p:cNvPicPr>
-            <a:picLocks noChangeAspect="1"/>
-          </p:cNvPicPr>
-          <p:nvPr/>
-        </p:nvPicPr>
-        <p:blipFill>
-          <a:blip r:embed="rId2"/>
-          <a:stretch>
-            <a:fillRect/>
-          </a:stretch>
-        </p:blipFill>
-        <p:spPr>
-          <a:xfrm>
-            <a:off x="3595880" y="0"/>
-            <a:ext cx="5000240" cy="6858000"/>
-          </a:xfrm>
-          <a:prstGeom prst="rect">
-            <a:avLst/>
-          </a:prstGeom>
-        </p:spPr>
-      </p:pic>
     </p:spTree>
     <p:extLst>
       <p:ext uri="{BB962C8B-B14F-4D97-AF65-F5344CB8AC3E}">
-        <p14:creationId xmlns:p14="http://schemas.microsoft.com/office/powerpoint/2010/main" val="4212965284"/>
-      </p:ext>
-    </p:extLst>
-  </p:cSld>
-  <p:clrMapOvr>
-    <a:masterClrMapping/>
-  </p:clrMapOvr>
-</p:sld>
-</file>
-
-<file path=ppt/slides/slide6.xml><?xml version="1.0" encoding="utf-8"?>
-<p:sld xmlns:a="http://schemas.openxmlformats.org/drawingml/2006/main" xmlns:r="http://schemas.openxmlformats.org/officeDocument/2006/relationships" xmlns:p="http://schemas.openxmlformats.org/presentationml/2006/main">
-  <p:cSld>
-    <p:spTree>
-      <p:nvGrpSpPr>
-        <p:cNvPr id="1" name=""/>
-        <p:cNvGrpSpPr/>
-        <p:nvPr/>
-      </p:nvGrpSpPr>
-      <p:grpSpPr>
-        <a:xfrm>
-          <a:off x="0" y="0"/>
-          <a:ext cx="0" cy="0"/>
-          <a:chOff x="0" y="0"/>
-          <a:chExt cx="0" cy="0"/>
-        </a:xfrm>
-      </p:grpSpPr>
-      <p:pic>
-        <p:nvPicPr>
-          <p:cNvPr id="5" name="Picture 4">
-            <a:extLst>
-              <a:ext uri="{FF2B5EF4-FFF2-40B4-BE49-F238E27FC236}">
-                <a16:creationId xmlns:a16="http://schemas.microsoft.com/office/drawing/2014/main" id="{28F362A9-9BAA-40F0-B564-2CE438276FE4}"/>
-              </a:ext>
-            </a:extLst>
-          </p:cNvPr>
-          <p:cNvPicPr>
-            <a:picLocks noChangeAspect="1"/>
-          </p:cNvPicPr>
-          <p:nvPr/>
-        </p:nvPicPr>
-        <p:blipFill>
-          <a:blip r:embed="rId2"/>
-          <a:stretch>
-            <a:fillRect/>
-          </a:stretch>
-        </p:blipFill>
-        <p:spPr>
-          <a:xfrm>
-            <a:off x="3599724" y="0"/>
-            <a:ext cx="4992552" cy="6858000"/>
-          </a:xfrm>
-          <a:prstGeom prst="rect">
-            <a:avLst/>
-          </a:prstGeom>
-        </p:spPr>
-      </p:pic>
-      <p:pic>
-        <p:nvPicPr>
-          <p:cNvPr id="6" name="Picture 5">
-            <a:extLst>
-              <a:ext uri="{FF2B5EF4-FFF2-40B4-BE49-F238E27FC236}">
-                <a16:creationId xmlns:a16="http://schemas.microsoft.com/office/drawing/2014/main" id="{BCBEF560-6ECC-458F-9A72-8BCC719AE603}"/>
-              </a:ext>
-            </a:extLst>
-          </p:cNvPr>
-          <p:cNvPicPr>
-            <a:picLocks noChangeAspect="1"/>
-          </p:cNvPicPr>
-          <p:nvPr/>
-        </p:nvPicPr>
-        <p:blipFill rotWithShape="1">
-          <a:blip r:embed="rId3">
-            <a:extLst>
-              <a:ext uri="{BEBA8EAE-BF5A-486C-A8C5-ECC9F3942E4B}">
-                <a14:imgProps xmlns:a14="http://schemas.microsoft.com/office/drawing/2010/main">
-                  <a14:imgLayer r:embed="rId4">
-                    <a14:imgEffect>
-                      <a14:artisticGlass/>
-                    </a14:imgEffect>
-                  </a14:imgLayer>
-                </a14:imgProps>
-              </a:ext>
-            </a:extLst>
-          </a:blip>
-          <a:srcRect l="9284" t="82870" r="19881" b="13796"/>
-          <a:stretch/>
-        </p:blipFill>
-        <p:spPr>
-          <a:xfrm>
-            <a:off x="3765551" y="5187950"/>
-            <a:ext cx="1117600" cy="222250"/>
-          </a:xfrm>
-          <a:prstGeom prst="rect">
-            <a:avLst/>
-          </a:prstGeom>
-        </p:spPr>
-      </p:pic>
-    </p:spTree>
-    <p:extLst>
-      <p:ext uri="{BB962C8B-B14F-4D97-AF65-F5344CB8AC3E}">
-        <p14:creationId xmlns:p14="http://schemas.microsoft.com/office/powerpoint/2010/main" val="822399426"/>
-      </p:ext>
-    </p:extLst>
-  </p:cSld>
-  <p:clrMapOvr>
-    <a:masterClrMapping/>
-  </p:clrMapOvr>
-</p:sld>
-</file>
-
-<file path=ppt/slides/slide7.xml><?xml version="1.0" encoding="utf-8"?>
-<p:sld xmlns:a="http://schemas.openxmlformats.org/drawingml/2006/main" xmlns:r="http://schemas.openxmlformats.org/officeDocument/2006/relationships" xmlns:p="http://schemas.openxmlformats.org/presentationml/2006/main">
-  <p:cSld>
-    <p:spTree>
-      <p:nvGrpSpPr>
-        <p:cNvPr id="1" name=""/>
-        <p:cNvGrpSpPr/>
-        <p:nvPr/>
-      </p:nvGrpSpPr>
-      <p:grpSpPr>
-        <a:xfrm>
-          <a:off x="0" y="0"/>
-          <a:ext cx="0" cy="0"/>
-          <a:chOff x="0" y="0"/>
-          <a:chExt cx="0" cy="0"/>
-        </a:xfrm>
-      </p:grpSpPr>
-      <p:pic>
-        <p:nvPicPr>
-          <p:cNvPr id="5" name="Picture 4">
-            <a:extLst>
-              <a:ext uri="{FF2B5EF4-FFF2-40B4-BE49-F238E27FC236}">
-                <a16:creationId xmlns:a16="http://schemas.microsoft.com/office/drawing/2014/main" id="{52CE252F-567F-44BA-877B-95913C711B24}"/>
-              </a:ext>
-            </a:extLst>
-          </p:cNvPr>
-          <p:cNvPicPr>
-            <a:picLocks noChangeAspect="1"/>
-          </p:cNvPicPr>
-          <p:nvPr/>
-        </p:nvPicPr>
-        <p:blipFill rotWithShape="1">
-          <a:blip r:embed="rId2"/>
-          <a:srcRect t="18880"/>
-          <a:stretch/>
-        </p:blipFill>
-        <p:spPr>
-          <a:xfrm>
-            <a:off x="4586276" y="2714625"/>
-            <a:ext cx="3019447" cy="1862146"/>
-          </a:xfrm>
-          <a:prstGeom prst="rect">
-            <a:avLst/>
-          </a:prstGeom>
-        </p:spPr>
-      </p:pic>
-      <p:pic>
-        <p:nvPicPr>
-          <p:cNvPr id="6" name="Picture 5">
-            <a:extLst>
-              <a:ext uri="{FF2B5EF4-FFF2-40B4-BE49-F238E27FC236}">
-                <a16:creationId xmlns:a16="http://schemas.microsoft.com/office/drawing/2014/main" id="{1D471C7D-4FBA-44AD-9FFE-0BCC9ACAEA57}"/>
-              </a:ext>
-            </a:extLst>
-          </p:cNvPr>
-          <p:cNvPicPr>
-            <a:picLocks noChangeAspect="1"/>
-          </p:cNvPicPr>
-          <p:nvPr/>
-        </p:nvPicPr>
-        <p:blipFill rotWithShape="1">
-          <a:blip r:embed="rId3">
-            <a:extLst>
-              <a:ext uri="{BEBA8EAE-BF5A-486C-A8C5-ECC9F3942E4B}">
-                <a14:imgProps xmlns:a14="http://schemas.microsoft.com/office/drawing/2010/main">
-                  <a14:imgLayer r:embed="rId4">
-                    <a14:imgEffect>
-                      <a14:artisticGlass/>
-                    </a14:imgEffect>
-                  </a14:imgLayer>
-                </a14:imgProps>
-              </a:ext>
-            </a:extLst>
-          </a:blip>
-          <a:srcRect l="9284" t="82870" r="19881" b="13796"/>
-          <a:stretch/>
-        </p:blipFill>
-        <p:spPr>
-          <a:xfrm>
-            <a:off x="4835524" y="4124325"/>
-            <a:ext cx="2406649" cy="114300"/>
-          </a:xfrm>
-          <a:prstGeom prst="rect">
-            <a:avLst/>
-          </a:prstGeom>
-        </p:spPr>
-      </p:pic>
-      <p:pic>
-        <p:nvPicPr>
-          <p:cNvPr id="10" name="Picture 9">
-            <a:extLst>
-              <a:ext uri="{FF2B5EF4-FFF2-40B4-BE49-F238E27FC236}">
-                <a16:creationId xmlns:a16="http://schemas.microsoft.com/office/drawing/2014/main" id="{A752347E-C2B9-49F1-B31F-F4FA47533F38}"/>
-              </a:ext>
-            </a:extLst>
-          </p:cNvPr>
-          <p:cNvPicPr>
-            <a:picLocks noChangeAspect="1"/>
-          </p:cNvPicPr>
-          <p:nvPr/>
-        </p:nvPicPr>
-        <p:blipFill rotWithShape="1">
-          <a:blip r:embed="rId3">
-            <a:extLst>
-              <a:ext uri="{BEBA8EAE-BF5A-486C-A8C5-ECC9F3942E4B}">
-                <a14:imgProps xmlns:a14="http://schemas.microsoft.com/office/drawing/2010/main">
-                  <a14:imgLayer r:embed="rId4">
-                    <a14:imgEffect>
-                      <a14:artisticGlass/>
-                    </a14:imgEffect>
-                  </a14:imgLayer>
-                </a14:imgProps>
-              </a:ext>
-            </a:extLst>
-          </a:blip>
-          <a:srcRect l="9284" t="82870" r="19881" b="13796"/>
-          <a:stretch/>
-        </p:blipFill>
-        <p:spPr>
-          <a:xfrm>
-            <a:off x="4835525" y="3981450"/>
-            <a:ext cx="688976" cy="114300"/>
-          </a:xfrm>
-          <a:prstGeom prst="rect">
-            <a:avLst/>
-          </a:prstGeom>
-        </p:spPr>
-      </p:pic>
-    </p:spTree>
-    <p:extLst>
-      <p:ext uri="{BB962C8B-B14F-4D97-AF65-F5344CB8AC3E}">
-        <p14:creationId xmlns:p14="http://schemas.microsoft.com/office/powerpoint/2010/main" val="3261590427"/>
-      </p:ext>
-    </p:extLst>
-  </p:cSld>
-  <p:clrMapOvr>
-    <a:masterClrMapping/>
-  </p:clrMapOvr>
-</p:sld>
-</file>
-
-<file path=ppt/slides/slide8.xml><?xml version="1.0" encoding="utf-8"?>
-<p:sld xmlns:a="http://schemas.openxmlformats.org/drawingml/2006/main" xmlns:r="http://schemas.openxmlformats.org/officeDocument/2006/relationships" xmlns:p="http://schemas.openxmlformats.org/presentationml/2006/main">
-  <p:cSld>
-    <p:spTree>
-      <p:nvGrpSpPr>
-        <p:cNvPr id="1" name=""/>
-        <p:cNvGrpSpPr/>
-        <p:nvPr/>
-      </p:nvGrpSpPr>
-      <p:grpSpPr>
-        <a:xfrm>
-          <a:off x="0" y="0"/>
-          <a:ext cx="0" cy="0"/>
-          <a:chOff x="0" y="0"/>
-          <a:chExt cx="0" cy="0"/>
-        </a:xfrm>
-      </p:grpSpPr>
-      <p:pic>
-        <p:nvPicPr>
-          <p:cNvPr id="5" name="Picture 4">
-            <a:extLst>
-              <a:ext uri="{FF2B5EF4-FFF2-40B4-BE49-F238E27FC236}">
-                <a16:creationId xmlns:a16="http://schemas.microsoft.com/office/drawing/2014/main" id="{C4FEE400-F52E-4D13-AA36-C151B7DE8472}"/>
-              </a:ext>
-            </a:extLst>
-          </p:cNvPr>
-          <p:cNvPicPr>
-            <a:picLocks noChangeAspect="1"/>
-          </p:cNvPicPr>
-          <p:nvPr/>
-        </p:nvPicPr>
-        <p:blipFill>
-          <a:blip r:embed="rId2"/>
-          <a:stretch>
-            <a:fillRect/>
-          </a:stretch>
-        </p:blipFill>
-        <p:spPr>
-          <a:xfrm>
-            <a:off x="2990827" y="2352667"/>
-            <a:ext cx="6210345" cy="2152666"/>
-          </a:xfrm>
-          <a:prstGeom prst="rect">
-            <a:avLst/>
-          </a:prstGeom>
-        </p:spPr>
-      </p:pic>
-      <p:pic>
-        <p:nvPicPr>
-          <p:cNvPr id="6" name="Picture 5">
-            <a:extLst>
-              <a:ext uri="{FF2B5EF4-FFF2-40B4-BE49-F238E27FC236}">
-                <a16:creationId xmlns:a16="http://schemas.microsoft.com/office/drawing/2014/main" id="{4459E0BB-7457-4DEC-B075-7091AB59821F}"/>
-              </a:ext>
-            </a:extLst>
-          </p:cNvPr>
-          <p:cNvPicPr>
-            <a:picLocks noChangeAspect="1"/>
-          </p:cNvPicPr>
-          <p:nvPr/>
-        </p:nvPicPr>
-        <p:blipFill rotWithShape="1">
-          <a:blip r:embed="rId3">
-            <a:extLst>
-              <a:ext uri="{BEBA8EAE-BF5A-486C-A8C5-ECC9F3942E4B}">
-                <a14:imgProps xmlns:a14="http://schemas.microsoft.com/office/drawing/2010/main">
-                  <a14:imgLayer r:embed="rId4">
-                    <a14:imgEffect>
-                      <a14:artisticGlass/>
-                    </a14:imgEffect>
-                  </a14:imgLayer>
-                </a14:imgProps>
-              </a:ext>
-            </a:extLst>
-          </a:blip>
-          <a:srcRect l="9284" t="82870" r="19881" b="13796"/>
-          <a:stretch/>
-        </p:blipFill>
-        <p:spPr>
-          <a:xfrm>
-            <a:off x="3914775" y="4213225"/>
-            <a:ext cx="650875" cy="57150"/>
-          </a:xfrm>
-          <a:prstGeom prst="rect">
-            <a:avLst/>
-          </a:prstGeom>
-        </p:spPr>
-      </p:pic>
-    </p:spTree>
-    <p:extLst>
-      <p:ext uri="{BB962C8B-B14F-4D97-AF65-F5344CB8AC3E}">
-        <p14:creationId xmlns:p14="http://schemas.microsoft.com/office/powerpoint/2010/main" val="1250587808"/>
-      </p:ext>
-    </p:extLst>
-  </p:cSld>
-  <p:clrMapOvr>
-    <a:masterClrMapping/>
-  </p:clrMapOvr>
-</p:sld>
-</file>
-
-<file path=ppt/slides/slide9.xml><?xml version="1.0" encoding="utf-8"?>
-<p:sld xmlns:a="http://schemas.openxmlformats.org/drawingml/2006/main" xmlns:r="http://schemas.openxmlformats.org/officeDocument/2006/relationships" xmlns:p="http://schemas.openxmlformats.org/presentationml/2006/main">
-  <p:cSld>
-    <p:spTree>
-      <p:nvGrpSpPr>
-        <p:cNvPr id="1" name=""/>
-        <p:cNvGrpSpPr/>
-        <p:nvPr/>
-      </p:nvGrpSpPr>
-      <p:grpSpPr>
-        <a:xfrm>
-          <a:off x="0" y="0"/>
-          <a:ext cx="0" cy="0"/>
-          <a:chOff x="0" y="0"/>
-          <a:chExt cx="0" cy="0"/>
-        </a:xfrm>
-      </p:grpSpPr>
-      <p:pic>
-        <p:nvPicPr>
-          <p:cNvPr id="6" name="Picture 5">
-            <a:extLst>
-              <a:ext uri="{FF2B5EF4-FFF2-40B4-BE49-F238E27FC236}">
-                <a16:creationId xmlns:a16="http://schemas.microsoft.com/office/drawing/2014/main" id="{FC677FC0-7AC3-4CE0-BA2F-4EDD419CA420}"/>
-              </a:ext>
-            </a:extLst>
-          </p:cNvPr>
-          <p:cNvPicPr>
-            <a:picLocks noChangeAspect="1"/>
-          </p:cNvPicPr>
-          <p:nvPr/>
-        </p:nvPicPr>
-        <p:blipFill>
-          <a:blip r:embed="rId2"/>
-          <a:stretch>
-            <a:fillRect/>
-          </a:stretch>
-        </p:blipFill>
-        <p:spPr>
-          <a:xfrm>
-            <a:off x="4152886" y="2543168"/>
-            <a:ext cx="3886228" cy="1771663"/>
-          </a:xfrm>
-          <a:prstGeom prst="rect">
-            <a:avLst/>
-          </a:prstGeom>
-        </p:spPr>
-      </p:pic>
-      <p:pic>
-        <p:nvPicPr>
-          <p:cNvPr id="4" name="Picture 3">
-            <a:extLst>
-              <a:ext uri="{FF2B5EF4-FFF2-40B4-BE49-F238E27FC236}">
-                <a16:creationId xmlns:a16="http://schemas.microsoft.com/office/drawing/2014/main" id="{430A0568-63E2-448D-A8BB-D681E4EC6B31}"/>
-              </a:ext>
-            </a:extLst>
-          </p:cNvPr>
-          <p:cNvPicPr>
-            <a:picLocks noChangeAspect="1"/>
-          </p:cNvPicPr>
-          <p:nvPr/>
-        </p:nvPicPr>
-        <p:blipFill rotWithShape="1">
-          <a:blip r:embed="rId3">
-            <a:extLst>
-              <a:ext uri="{BEBA8EAE-BF5A-486C-A8C5-ECC9F3942E4B}">
-                <a14:imgProps xmlns:a14="http://schemas.microsoft.com/office/drawing/2010/main">
-                  <a14:imgLayer r:embed="rId4">
-                    <a14:imgEffect>
-                      <a14:artisticGlass/>
-                    </a14:imgEffect>
-                  </a14:imgLayer>
-                </a14:imgProps>
-              </a:ext>
-            </a:extLst>
-          </a:blip>
-          <a:srcRect l="9284" t="82870" r="19881" b="13796"/>
-          <a:stretch/>
-        </p:blipFill>
-        <p:spPr>
-          <a:xfrm>
-            <a:off x="5422901" y="2968625"/>
-            <a:ext cx="1117600" cy="222250"/>
-          </a:xfrm>
-          <a:prstGeom prst="rect">
-            <a:avLst/>
-          </a:prstGeom>
-        </p:spPr>
-      </p:pic>
-    </p:spTree>
-    <p:extLst>
-      <p:ext uri="{BB962C8B-B14F-4D97-AF65-F5344CB8AC3E}">
-        <p14:creationId xmlns:p14="http://schemas.microsoft.com/office/powerpoint/2010/main" val="2998061435"/>
+        <p14:creationId xmlns:p14="http://schemas.microsoft.com/office/powerpoint/2010/main" val="3623422223"/>
       </p:ext>
     </p:extLst>
   </p:cSld>

</xml_diff>

<commit_message>
edit readme and images
</commit_message>
<xml_diff>
--- a/images/ProcessMap.pptx
+++ b/images/ProcessMap.pptx
@@ -129,7 +129,7 @@
   <pc:docChgLst>
     <pc:chgData name="Jared Fiacco" userId="e4f6bfaef04c63d1" providerId="LiveId" clId="{D38C5BE2-17A7-461C-BD94-6C0C7CDA27B5}"/>
     <pc:docChg chg="undo custSel addSld delSld modSld">
-      <pc:chgData name="Jared Fiacco" userId="e4f6bfaef04c63d1" providerId="LiveId" clId="{D38C5BE2-17A7-461C-BD94-6C0C7CDA27B5}" dt="2022-05-20T00:23:04.046" v="344" actId="478"/>
+      <pc:chgData name="Jared Fiacco" userId="e4f6bfaef04c63d1" providerId="LiveId" clId="{D38C5BE2-17A7-461C-BD94-6C0C7CDA27B5}" dt="2022-05-20T00:34:38.990" v="345" actId="478"/>
       <pc:docMkLst>
         <pc:docMk/>
       </pc:docMkLst>
@@ -183,7 +183,7 @@
         </pc:sldMkLst>
       </pc:sldChg>
       <pc:sldChg chg="addSp delSp modSp mod">
-        <pc:chgData name="Jared Fiacco" userId="e4f6bfaef04c63d1" providerId="LiveId" clId="{D38C5BE2-17A7-461C-BD94-6C0C7CDA27B5}" dt="2022-05-19T23:48:58.648" v="292" actId="1076"/>
+        <pc:chgData name="Jared Fiacco" userId="e4f6bfaef04c63d1" providerId="LiveId" clId="{D38C5BE2-17A7-461C-BD94-6C0C7CDA27B5}" dt="2022-05-20T00:34:38.990" v="345" actId="478"/>
         <pc:sldMkLst>
           <pc:docMk/>
           <pc:sldMk cId="2637552424" sldId="266"/>
@@ -460,8 +460,8 @@
             <ac:cxnSpMk id="54" creationId="{2A5D7007-D002-4D32-AA23-2FAA6C8C54FF}"/>
           </ac:cxnSpMkLst>
         </pc:cxnChg>
-        <pc:cxnChg chg="mod">
-          <ac:chgData name="Jared Fiacco" userId="e4f6bfaef04c63d1" providerId="LiveId" clId="{D38C5BE2-17A7-461C-BD94-6C0C7CDA27B5}" dt="2022-05-19T23:48:58.648" v="292" actId="1076"/>
+        <pc:cxnChg chg="del mod">
+          <ac:chgData name="Jared Fiacco" userId="e4f6bfaef04c63d1" providerId="LiveId" clId="{D38C5BE2-17A7-461C-BD94-6C0C7CDA27B5}" dt="2022-05-20T00:34:38.990" v="345" actId="478"/>
           <ac:cxnSpMkLst>
             <pc:docMk/>
             <pc:sldMk cId="2637552424" sldId="266"/>
@@ -5137,50 +5137,6 @@
         <p:spPr>
           <a:xfrm flipV="1">
             <a:off x="8899674" y="2543308"/>
-            <a:ext cx="501644" cy="2457"/>
-          </a:xfrm>
-          <a:prstGeom prst="straightConnector1">
-            <a:avLst/>
-          </a:prstGeom>
-          <a:ln w="57150">
-            <a:solidFill>
-              <a:schemeClr val="tx2"/>
-            </a:solidFill>
-            <a:tailEnd type="triangle"/>
-          </a:ln>
-        </p:spPr>
-        <p:style>
-          <a:lnRef idx="1">
-            <a:schemeClr val="accent1"/>
-          </a:lnRef>
-          <a:fillRef idx="0">
-            <a:schemeClr val="accent1"/>
-          </a:fillRef>
-          <a:effectRef idx="0">
-            <a:schemeClr val="accent1"/>
-          </a:effectRef>
-          <a:fontRef idx="minor">
-            <a:schemeClr val="tx1"/>
-          </a:fontRef>
-        </p:style>
-      </p:cxnSp>
-      <p:cxnSp>
-        <p:nvCxnSpPr>
-          <p:cNvPr id="59" name="Straight Arrow Connector 58">
-            <a:extLst>
-              <a:ext uri="{FF2B5EF4-FFF2-40B4-BE49-F238E27FC236}">
-                <a16:creationId xmlns:a16="http://schemas.microsoft.com/office/drawing/2014/main" id="{723B867F-CE77-4420-880F-7FBB1581F784}"/>
-              </a:ext>
-            </a:extLst>
-          </p:cNvPr>
-          <p:cNvCxnSpPr>
-            <a:cxnSpLocks/>
-          </p:cNvCxnSpPr>
-          <p:nvPr/>
-        </p:nvCxnSpPr>
-        <p:spPr>
-          <a:xfrm flipV="1">
-            <a:off x="10593460" y="2540851"/>
             <a:ext cx="501644" cy="2457"/>
           </a:xfrm>
           <a:prstGeom prst="straightConnector1">

</xml_diff>